<commit_message>
Scrittura di Template use case/Template News.pptx
</commit_message>
<xml_diff>
--- a/docs/analisi/Template use case/Template News.pptx
+++ b/docs/analisi/Template use case/Template News.pptx
@@ -286,7 +286,7 @@
           <p:cNvPr id="2" name="Titolo 1">
             <a:extLst>
               <a:ext uri="{FF2B5EF4-FFF2-40B4-BE49-F238E27FC236}">
-                <a16:creationId xmlns="" xmlns:a16="http://schemas.microsoft.com/office/drawing/2014/main" id="{CFBF2858-9FF9-49F6-9325-A5B5D4185723}"/>
+                <a16:creationId xmlns:a16="http://schemas.microsoft.com/office/drawing/2014/main" xmlns="" id="{CFBF2858-9FF9-49F6-9325-A5B5D4185723}"/>
               </a:ext>
             </a:extLst>
           </p:cNvPr>
@@ -323,7 +323,7 @@
           <p:cNvPr id="3" name="Sottotitolo 2">
             <a:extLst>
               <a:ext uri="{FF2B5EF4-FFF2-40B4-BE49-F238E27FC236}">
-                <a16:creationId xmlns="" xmlns:a16="http://schemas.microsoft.com/office/drawing/2014/main" id="{4B21D84B-ED35-4CD0-B889-7022650B2578}"/>
+                <a16:creationId xmlns:a16="http://schemas.microsoft.com/office/drawing/2014/main" xmlns="" id="{4B21D84B-ED35-4CD0-B889-7022650B2578}"/>
               </a:ext>
             </a:extLst>
           </p:cNvPr>
@@ -393,7 +393,7 @@
           <p:cNvPr id="4" name="Segnaposto data 3">
             <a:extLst>
               <a:ext uri="{FF2B5EF4-FFF2-40B4-BE49-F238E27FC236}">
-                <a16:creationId xmlns="" xmlns:a16="http://schemas.microsoft.com/office/drawing/2014/main" id="{E66C651E-1356-4A58-BA17-ECFD882A1A0D}"/>
+                <a16:creationId xmlns:a16="http://schemas.microsoft.com/office/drawing/2014/main" xmlns="" id="{E66C651E-1356-4A58-BA17-ECFD882A1A0D}"/>
               </a:ext>
             </a:extLst>
           </p:cNvPr>
@@ -411,7 +411,7 @@
           <a:p>
             <a:fld id="{F7D71F90-2C6D-44F6-A1F9-0B80B911F8CA}" type="datetimeFigureOut">
               <a:rPr lang="it-IT" smtClean="0"/>
-              <a:t>13/12/2019</a:t>
+              <a:t>16/12/2019</a:t>
             </a:fld>
             <a:endParaRPr lang="it-IT"/>
           </a:p>
@@ -422,7 +422,7 @@
           <p:cNvPr id="5" name="Segnaposto piè di pagina 4">
             <a:extLst>
               <a:ext uri="{FF2B5EF4-FFF2-40B4-BE49-F238E27FC236}">
-                <a16:creationId xmlns="" xmlns:a16="http://schemas.microsoft.com/office/drawing/2014/main" id="{74328D79-8461-43BC-84DA-249AF43BC14A}"/>
+                <a16:creationId xmlns:a16="http://schemas.microsoft.com/office/drawing/2014/main" xmlns="" id="{74328D79-8461-43BC-84DA-249AF43BC14A}"/>
               </a:ext>
             </a:extLst>
           </p:cNvPr>
@@ -447,7 +447,7 @@
           <p:cNvPr id="6" name="Segnaposto numero diapositiva 5">
             <a:extLst>
               <a:ext uri="{FF2B5EF4-FFF2-40B4-BE49-F238E27FC236}">
-                <a16:creationId xmlns="" xmlns:a16="http://schemas.microsoft.com/office/drawing/2014/main" id="{816387D6-94E6-47FE-871A-C8EF03F29BDB}"/>
+                <a16:creationId xmlns:a16="http://schemas.microsoft.com/office/drawing/2014/main" xmlns="" id="{816387D6-94E6-47FE-871A-C8EF03F29BDB}"/>
               </a:ext>
             </a:extLst>
           </p:cNvPr>
@@ -506,7 +506,7 @@
           <p:cNvPr id="2" name="Titolo 1">
             <a:extLst>
               <a:ext uri="{FF2B5EF4-FFF2-40B4-BE49-F238E27FC236}">
-                <a16:creationId xmlns="" xmlns:a16="http://schemas.microsoft.com/office/drawing/2014/main" id="{F59AC4B1-2C56-4BBF-A05F-D9500F78FEB9}"/>
+                <a16:creationId xmlns:a16="http://schemas.microsoft.com/office/drawing/2014/main" xmlns="" id="{F59AC4B1-2C56-4BBF-A05F-D9500F78FEB9}"/>
               </a:ext>
             </a:extLst>
           </p:cNvPr>
@@ -534,7 +534,7 @@
           <p:cNvPr id="3" name="Segnaposto testo verticale 2">
             <a:extLst>
               <a:ext uri="{FF2B5EF4-FFF2-40B4-BE49-F238E27FC236}">
-                <a16:creationId xmlns="" xmlns:a16="http://schemas.microsoft.com/office/drawing/2014/main" id="{90389E8C-63A3-42AB-93CD-0F8792454FCC}"/>
+                <a16:creationId xmlns:a16="http://schemas.microsoft.com/office/drawing/2014/main" xmlns="" id="{90389E8C-63A3-42AB-93CD-0F8792454FCC}"/>
               </a:ext>
             </a:extLst>
           </p:cNvPr>
@@ -591,7 +591,7 @@
           <p:cNvPr id="4" name="Segnaposto data 3">
             <a:extLst>
               <a:ext uri="{FF2B5EF4-FFF2-40B4-BE49-F238E27FC236}">
-                <a16:creationId xmlns="" xmlns:a16="http://schemas.microsoft.com/office/drawing/2014/main" id="{254FADA6-B05E-4B35-A06A-2022D2DBEC26}"/>
+                <a16:creationId xmlns:a16="http://schemas.microsoft.com/office/drawing/2014/main" xmlns="" id="{254FADA6-B05E-4B35-A06A-2022D2DBEC26}"/>
               </a:ext>
             </a:extLst>
           </p:cNvPr>
@@ -609,7 +609,7 @@
           <a:p>
             <a:fld id="{F7D71F90-2C6D-44F6-A1F9-0B80B911F8CA}" type="datetimeFigureOut">
               <a:rPr lang="it-IT" smtClean="0"/>
-              <a:t>13/12/2019</a:t>
+              <a:t>16/12/2019</a:t>
             </a:fld>
             <a:endParaRPr lang="it-IT"/>
           </a:p>
@@ -620,7 +620,7 @@
           <p:cNvPr id="5" name="Segnaposto piè di pagina 4">
             <a:extLst>
               <a:ext uri="{FF2B5EF4-FFF2-40B4-BE49-F238E27FC236}">
-                <a16:creationId xmlns="" xmlns:a16="http://schemas.microsoft.com/office/drawing/2014/main" id="{0631869E-DF6C-4226-B729-2123308FE398}"/>
+                <a16:creationId xmlns:a16="http://schemas.microsoft.com/office/drawing/2014/main" xmlns="" id="{0631869E-DF6C-4226-B729-2123308FE398}"/>
               </a:ext>
             </a:extLst>
           </p:cNvPr>
@@ -645,7 +645,7 @@
           <p:cNvPr id="6" name="Segnaposto numero diapositiva 5">
             <a:extLst>
               <a:ext uri="{FF2B5EF4-FFF2-40B4-BE49-F238E27FC236}">
-                <a16:creationId xmlns="" xmlns:a16="http://schemas.microsoft.com/office/drawing/2014/main" id="{5EBEEC90-B83C-4DEE-937E-C7EC1D025508}"/>
+                <a16:creationId xmlns:a16="http://schemas.microsoft.com/office/drawing/2014/main" xmlns="" id="{5EBEEC90-B83C-4DEE-937E-C7EC1D025508}"/>
               </a:ext>
             </a:extLst>
           </p:cNvPr>
@@ -704,7 +704,7 @@
           <p:cNvPr id="2" name="Titolo verticale 1">
             <a:extLst>
               <a:ext uri="{FF2B5EF4-FFF2-40B4-BE49-F238E27FC236}">
-                <a16:creationId xmlns="" xmlns:a16="http://schemas.microsoft.com/office/drawing/2014/main" id="{30E33601-4D9B-4E96-B3C3-AB65F0C81F37}"/>
+                <a16:creationId xmlns:a16="http://schemas.microsoft.com/office/drawing/2014/main" xmlns="" id="{30E33601-4D9B-4E96-B3C3-AB65F0C81F37}"/>
               </a:ext>
             </a:extLst>
           </p:cNvPr>
@@ -737,7 +737,7 @@
           <p:cNvPr id="3" name="Segnaposto testo verticale 2">
             <a:extLst>
               <a:ext uri="{FF2B5EF4-FFF2-40B4-BE49-F238E27FC236}">
-                <a16:creationId xmlns="" xmlns:a16="http://schemas.microsoft.com/office/drawing/2014/main" id="{FEDAA464-5CD2-4C93-83F5-E13251F55648}"/>
+                <a16:creationId xmlns:a16="http://schemas.microsoft.com/office/drawing/2014/main" xmlns="" id="{FEDAA464-5CD2-4C93-83F5-E13251F55648}"/>
               </a:ext>
             </a:extLst>
           </p:cNvPr>
@@ -799,7 +799,7 @@
           <p:cNvPr id="4" name="Segnaposto data 3">
             <a:extLst>
               <a:ext uri="{FF2B5EF4-FFF2-40B4-BE49-F238E27FC236}">
-                <a16:creationId xmlns="" xmlns:a16="http://schemas.microsoft.com/office/drawing/2014/main" id="{F61719B4-CD99-4540-BEA4-8B7884B7C59C}"/>
+                <a16:creationId xmlns:a16="http://schemas.microsoft.com/office/drawing/2014/main" xmlns="" id="{F61719B4-CD99-4540-BEA4-8B7884B7C59C}"/>
               </a:ext>
             </a:extLst>
           </p:cNvPr>
@@ -817,7 +817,7 @@
           <a:p>
             <a:fld id="{F7D71F90-2C6D-44F6-A1F9-0B80B911F8CA}" type="datetimeFigureOut">
               <a:rPr lang="it-IT" smtClean="0"/>
-              <a:t>13/12/2019</a:t>
+              <a:t>16/12/2019</a:t>
             </a:fld>
             <a:endParaRPr lang="it-IT"/>
           </a:p>
@@ -828,7 +828,7 @@
           <p:cNvPr id="5" name="Segnaposto piè di pagina 4">
             <a:extLst>
               <a:ext uri="{FF2B5EF4-FFF2-40B4-BE49-F238E27FC236}">
-                <a16:creationId xmlns="" xmlns:a16="http://schemas.microsoft.com/office/drawing/2014/main" id="{30F0B4A5-E6FA-4C78-86A7-F528FA130059}"/>
+                <a16:creationId xmlns:a16="http://schemas.microsoft.com/office/drawing/2014/main" xmlns="" id="{30F0B4A5-E6FA-4C78-86A7-F528FA130059}"/>
               </a:ext>
             </a:extLst>
           </p:cNvPr>
@@ -853,7 +853,7 @@
           <p:cNvPr id="6" name="Segnaposto numero diapositiva 5">
             <a:extLst>
               <a:ext uri="{FF2B5EF4-FFF2-40B4-BE49-F238E27FC236}">
-                <a16:creationId xmlns="" xmlns:a16="http://schemas.microsoft.com/office/drawing/2014/main" id="{442BF533-5946-4F10-92FC-3CD5053CF4D8}"/>
+                <a16:creationId xmlns:a16="http://schemas.microsoft.com/office/drawing/2014/main" xmlns="" id="{442BF533-5946-4F10-92FC-3CD5053CF4D8}"/>
               </a:ext>
             </a:extLst>
           </p:cNvPr>
@@ -912,7 +912,7 @@
           <p:cNvPr id="2" name="Titolo 1">
             <a:extLst>
               <a:ext uri="{FF2B5EF4-FFF2-40B4-BE49-F238E27FC236}">
-                <a16:creationId xmlns="" xmlns:a16="http://schemas.microsoft.com/office/drawing/2014/main" id="{8D324EC4-C5F5-4344-815B-63064E440846}"/>
+                <a16:creationId xmlns:a16="http://schemas.microsoft.com/office/drawing/2014/main" xmlns="" id="{8D324EC4-C5F5-4344-815B-63064E440846}"/>
               </a:ext>
             </a:extLst>
           </p:cNvPr>
@@ -940,7 +940,7 @@
           <p:cNvPr id="3" name="Segnaposto contenuto 2">
             <a:extLst>
               <a:ext uri="{FF2B5EF4-FFF2-40B4-BE49-F238E27FC236}">
-                <a16:creationId xmlns="" xmlns:a16="http://schemas.microsoft.com/office/drawing/2014/main" id="{55775342-FE66-4A01-9E0A-B6DFF50813CF}"/>
+                <a16:creationId xmlns:a16="http://schemas.microsoft.com/office/drawing/2014/main" xmlns="" id="{55775342-FE66-4A01-9E0A-B6DFF50813CF}"/>
               </a:ext>
             </a:extLst>
           </p:cNvPr>
@@ -997,7 +997,7 @@
           <p:cNvPr id="4" name="Segnaposto data 3">
             <a:extLst>
               <a:ext uri="{FF2B5EF4-FFF2-40B4-BE49-F238E27FC236}">
-                <a16:creationId xmlns="" xmlns:a16="http://schemas.microsoft.com/office/drawing/2014/main" id="{397A9FE5-70AC-44CE-914B-A1E1953D424A}"/>
+                <a16:creationId xmlns:a16="http://schemas.microsoft.com/office/drawing/2014/main" xmlns="" id="{397A9FE5-70AC-44CE-914B-A1E1953D424A}"/>
               </a:ext>
             </a:extLst>
           </p:cNvPr>
@@ -1015,7 +1015,7 @@
           <a:p>
             <a:fld id="{F7D71F90-2C6D-44F6-A1F9-0B80B911F8CA}" type="datetimeFigureOut">
               <a:rPr lang="it-IT" smtClean="0"/>
-              <a:t>13/12/2019</a:t>
+              <a:t>16/12/2019</a:t>
             </a:fld>
             <a:endParaRPr lang="it-IT"/>
           </a:p>
@@ -1026,7 +1026,7 @@
           <p:cNvPr id="5" name="Segnaposto piè di pagina 4">
             <a:extLst>
               <a:ext uri="{FF2B5EF4-FFF2-40B4-BE49-F238E27FC236}">
-                <a16:creationId xmlns="" xmlns:a16="http://schemas.microsoft.com/office/drawing/2014/main" id="{955E82A6-47E5-4A43-8C14-EB032BC59D50}"/>
+                <a16:creationId xmlns:a16="http://schemas.microsoft.com/office/drawing/2014/main" xmlns="" id="{955E82A6-47E5-4A43-8C14-EB032BC59D50}"/>
               </a:ext>
             </a:extLst>
           </p:cNvPr>
@@ -1051,7 +1051,7 @@
           <p:cNvPr id="6" name="Segnaposto numero diapositiva 5">
             <a:extLst>
               <a:ext uri="{FF2B5EF4-FFF2-40B4-BE49-F238E27FC236}">
-                <a16:creationId xmlns="" xmlns:a16="http://schemas.microsoft.com/office/drawing/2014/main" id="{58E8D349-F894-470A-B25E-2196ABC42040}"/>
+                <a16:creationId xmlns:a16="http://schemas.microsoft.com/office/drawing/2014/main" xmlns="" id="{58E8D349-F894-470A-B25E-2196ABC42040}"/>
               </a:ext>
             </a:extLst>
           </p:cNvPr>
@@ -1110,7 +1110,7 @@
           <p:cNvPr id="2" name="Titolo 1">
             <a:extLst>
               <a:ext uri="{FF2B5EF4-FFF2-40B4-BE49-F238E27FC236}">
-                <a16:creationId xmlns="" xmlns:a16="http://schemas.microsoft.com/office/drawing/2014/main" id="{FF8A343A-BEE9-48C2-8F08-6D02BD514F3F}"/>
+                <a16:creationId xmlns:a16="http://schemas.microsoft.com/office/drawing/2014/main" xmlns="" id="{FF8A343A-BEE9-48C2-8F08-6D02BD514F3F}"/>
               </a:ext>
             </a:extLst>
           </p:cNvPr>
@@ -1147,7 +1147,7 @@
           <p:cNvPr id="3" name="Segnaposto testo 2">
             <a:extLst>
               <a:ext uri="{FF2B5EF4-FFF2-40B4-BE49-F238E27FC236}">
-                <a16:creationId xmlns="" xmlns:a16="http://schemas.microsoft.com/office/drawing/2014/main" id="{0909A412-AD76-4989-B06E-E33E0F00580E}"/>
+                <a16:creationId xmlns:a16="http://schemas.microsoft.com/office/drawing/2014/main" xmlns="" id="{0909A412-AD76-4989-B06E-E33E0F00580E}"/>
               </a:ext>
             </a:extLst>
           </p:cNvPr>
@@ -1272,7 +1272,7 @@
           <p:cNvPr id="4" name="Segnaposto data 3">
             <a:extLst>
               <a:ext uri="{FF2B5EF4-FFF2-40B4-BE49-F238E27FC236}">
-                <a16:creationId xmlns="" xmlns:a16="http://schemas.microsoft.com/office/drawing/2014/main" id="{16318882-43E1-4C25-B100-9FE081333575}"/>
+                <a16:creationId xmlns:a16="http://schemas.microsoft.com/office/drawing/2014/main" xmlns="" id="{16318882-43E1-4C25-B100-9FE081333575}"/>
               </a:ext>
             </a:extLst>
           </p:cNvPr>
@@ -1290,7 +1290,7 @@
           <a:p>
             <a:fld id="{F7D71F90-2C6D-44F6-A1F9-0B80B911F8CA}" type="datetimeFigureOut">
               <a:rPr lang="it-IT" smtClean="0"/>
-              <a:t>13/12/2019</a:t>
+              <a:t>16/12/2019</a:t>
             </a:fld>
             <a:endParaRPr lang="it-IT"/>
           </a:p>
@@ -1301,7 +1301,7 @@
           <p:cNvPr id="5" name="Segnaposto piè di pagina 4">
             <a:extLst>
               <a:ext uri="{FF2B5EF4-FFF2-40B4-BE49-F238E27FC236}">
-                <a16:creationId xmlns="" xmlns:a16="http://schemas.microsoft.com/office/drawing/2014/main" id="{C6C78431-C23D-4359-9F41-506C478EC2A0}"/>
+                <a16:creationId xmlns:a16="http://schemas.microsoft.com/office/drawing/2014/main" xmlns="" id="{C6C78431-C23D-4359-9F41-506C478EC2A0}"/>
               </a:ext>
             </a:extLst>
           </p:cNvPr>
@@ -1326,7 +1326,7 @@
           <p:cNvPr id="6" name="Segnaposto numero diapositiva 5">
             <a:extLst>
               <a:ext uri="{FF2B5EF4-FFF2-40B4-BE49-F238E27FC236}">
-                <a16:creationId xmlns="" xmlns:a16="http://schemas.microsoft.com/office/drawing/2014/main" id="{DCF015C2-4C12-42A4-9944-4B1FE7A7FFB1}"/>
+                <a16:creationId xmlns:a16="http://schemas.microsoft.com/office/drawing/2014/main" xmlns="" id="{DCF015C2-4C12-42A4-9944-4B1FE7A7FFB1}"/>
               </a:ext>
             </a:extLst>
           </p:cNvPr>
@@ -1385,7 +1385,7 @@
           <p:cNvPr id="2" name="Titolo 1">
             <a:extLst>
               <a:ext uri="{FF2B5EF4-FFF2-40B4-BE49-F238E27FC236}">
-                <a16:creationId xmlns="" xmlns:a16="http://schemas.microsoft.com/office/drawing/2014/main" id="{7650FD1C-41AC-4FD0-8AF4-B2BFB5ECBDC7}"/>
+                <a16:creationId xmlns:a16="http://schemas.microsoft.com/office/drawing/2014/main" xmlns="" id="{7650FD1C-41AC-4FD0-8AF4-B2BFB5ECBDC7}"/>
               </a:ext>
             </a:extLst>
           </p:cNvPr>
@@ -1413,7 +1413,7 @@
           <p:cNvPr id="3" name="Segnaposto contenuto 2">
             <a:extLst>
               <a:ext uri="{FF2B5EF4-FFF2-40B4-BE49-F238E27FC236}">
-                <a16:creationId xmlns="" xmlns:a16="http://schemas.microsoft.com/office/drawing/2014/main" id="{DD16E77D-6E44-4E42-B7EA-AA87E0A9DBF9}"/>
+                <a16:creationId xmlns:a16="http://schemas.microsoft.com/office/drawing/2014/main" xmlns="" id="{DD16E77D-6E44-4E42-B7EA-AA87E0A9DBF9}"/>
               </a:ext>
             </a:extLst>
           </p:cNvPr>
@@ -1475,7 +1475,7 @@
           <p:cNvPr id="4" name="Segnaposto contenuto 3">
             <a:extLst>
               <a:ext uri="{FF2B5EF4-FFF2-40B4-BE49-F238E27FC236}">
-                <a16:creationId xmlns="" xmlns:a16="http://schemas.microsoft.com/office/drawing/2014/main" id="{844F8AF1-BDF4-4BB6-AA12-D9E74887B7AA}"/>
+                <a16:creationId xmlns:a16="http://schemas.microsoft.com/office/drawing/2014/main" xmlns="" id="{844F8AF1-BDF4-4BB6-AA12-D9E74887B7AA}"/>
               </a:ext>
             </a:extLst>
           </p:cNvPr>
@@ -1537,7 +1537,7 @@
           <p:cNvPr id="5" name="Segnaposto data 4">
             <a:extLst>
               <a:ext uri="{FF2B5EF4-FFF2-40B4-BE49-F238E27FC236}">
-                <a16:creationId xmlns="" xmlns:a16="http://schemas.microsoft.com/office/drawing/2014/main" id="{64E49264-4D9E-4F69-ADBE-5FCE7E088F87}"/>
+                <a16:creationId xmlns:a16="http://schemas.microsoft.com/office/drawing/2014/main" xmlns="" id="{64E49264-4D9E-4F69-ADBE-5FCE7E088F87}"/>
               </a:ext>
             </a:extLst>
           </p:cNvPr>
@@ -1555,7 +1555,7 @@
           <a:p>
             <a:fld id="{F7D71F90-2C6D-44F6-A1F9-0B80B911F8CA}" type="datetimeFigureOut">
               <a:rPr lang="it-IT" smtClean="0"/>
-              <a:t>13/12/2019</a:t>
+              <a:t>16/12/2019</a:t>
             </a:fld>
             <a:endParaRPr lang="it-IT"/>
           </a:p>
@@ -1566,7 +1566,7 @@
           <p:cNvPr id="6" name="Segnaposto piè di pagina 5">
             <a:extLst>
               <a:ext uri="{FF2B5EF4-FFF2-40B4-BE49-F238E27FC236}">
-                <a16:creationId xmlns="" xmlns:a16="http://schemas.microsoft.com/office/drawing/2014/main" id="{6BD94B07-3F97-448F-A14A-F799F51B318D}"/>
+                <a16:creationId xmlns:a16="http://schemas.microsoft.com/office/drawing/2014/main" xmlns="" id="{6BD94B07-3F97-448F-A14A-F799F51B318D}"/>
               </a:ext>
             </a:extLst>
           </p:cNvPr>
@@ -1591,7 +1591,7 @@
           <p:cNvPr id="7" name="Segnaposto numero diapositiva 6">
             <a:extLst>
               <a:ext uri="{FF2B5EF4-FFF2-40B4-BE49-F238E27FC236}">
-                <a16:creationId xmlns="" xmlns:a16="http://schemas.microsoft.com/office/drawing/2014/main" id="{B0CD1917-F8A2-456F-82E6-C095438948B0}"/>
+                <a16:creationId xmlns:a16="http://schemas.microsoft.com/office/drawing/2014/main" xmlns="" id="{B0CD1917-F8A2-456F-82E6-C095438948B0}"/>
               </a:ext>
             </a:extLst>
           </p:cNvPr>
@@ -1650,7 +1650,7 @@
           <p:cNvPr id="2" name="Titolo 1">
             <a:extLst>
               <a:ext uri="{FF2B5EF4-FFF2-40B4-BE49-F238E27FC236}">
-                <a16:creationId xmlns="" xmlns:a16="http://schemas.microsoft.com/office/drawing/2014/main" id="{B58BF815-104D-4049-9B9F-5BEFA614935C}"/>
+                <a16:creationId xmlns:a16="http://schemas.microsoft.com/office/drawing/2014/main" xmlns="" id="{B58BF815-104D-4049-9B9F-5BEFA614935C}"/>
               </a:ext>
             </a:extLst>
           </p:cNvPr>
@@ -1683,7 +1683,7 @@
           <p:cNvPr id="3" name="Segnaposto testo 2">
             <a:extLst>
               <a:ext uri="{FF2B5EF4-FFF2-40B4-BE49-F238E27FC236}">
-                <a16:creationId xmlns="" xmlns:a16="http://schemas.microsoft.com/office/drawing/2014/main" id="{CAE85FF7-9C0E-4DB9-A6AB-9133F631A4B3}"/>
+                <a16:creationId xmlns:a16="http://schemas.microsoft.com/office/drawing/2014/main" xmlns="" id="{CAE85FF7-9C0E-4DB9-A6AB-9133F631A4B3}"/>
               </a:ext>
             </a:extLst>
           </p:cNvPr>
@@ -1754,7 +1754,7 @@
           <p:cNvPr id="4" name="Segnaposto contenuto 3">
             <a:extLst>
               <a:ext uri="{FF2B5EF4-FFF2-40B4-BE49-F238E27FC236}">
-                <a16:creationId xmlns="" xmlns:a16="http://schemas.microsoft.com/office/drawing/2014/main" id="{31A1FF07-A483-4CBC-B502-D2040A241C59}"/>
+                <a16:creationId xmlns:a16="http://schemas.microsoft.com/office/drawing/2014/main" xmlns="" id="{31A1FF07-A483-4CBC-B502-D2040A241C59}"/>
               </a:ext>
             </a:extLst>
           </p:cNvPr>
@@ -1816,7 +1816,7 @@
           <p:cNvPr id="5" name="Segnaposto testo 4">
             <a:extLst>
               <a:ext uri="{FF2B5EF4-FFF2-40B4-BE49-F238E27FC236}">
-                <a16:creationId xmlns="" xmlns:a16="http://schemas.microsoft.com/office/drawing/2014/main" id="{30D9E67F-0023-4AD8-8149-34BD4C055D4E}"/>
+                <a16:creationId xmlns:a16="http://schemas.microsoft.com/office/drawing/2014/main" xmlns="" id="{30D9E67F-0023-4AD8-8149-34BD4C055D4E}"/>
               </a:ext>
             </a:extLst>
           </p:cNvPr>
@@ -1887,7 +1887,7 @@
           <p:cNvPr id="6" name="Segnaposto contenuto 5">
             <a:extLst>
               <a:ext uri="{FF2B5EF4-FFF2-40B4-BE49-F238E27FC236}">
-                <a16:creationId xmlns="" xmlns:a16="http://schemas.microsoft.com/office/drawing/2014/main" id="{23831668-98C0-4979-87D7-959474A9085E}"/>
+                <a16:creationId xmlns:a16="http://schemas.microsoft.com/office/drawing/2014/main" xmlns="" id="{23831668-98C0-4979-87D7-959474A9085E}"/>
               </a:ext>
             </a:extLst>
           </p:cNvPr>
@@ -1949,7 +1949,7 @@
           <p:cNvPr id="7" name="Segnaposto data 6">
             <a:extLst>
               <a:ext uri="{FF2B5EF4-FFF2-40B4-BE49-F238E27FC236}">
-                <a16:creationId xmlns="" xmlns:a16="http://schemas.microsoft.com/office/drawing/2014/main" id="{91B922F5-7D11-4052-AF29-AA3B75B06734}"/>
+                <a16:creationId xmlns:a16="http://schemas.microsoft.com/office/drawing/2014/main" xmlns="" id="{91B922F5-7D11-4052-AF29-AA3B75B06734}"/>
               </a:ext>
             </a:extLst>
           </p:cNvPr>
@@ -1967,7 +1967,7 @@
           <a:p>
             <a:fld id="{F7D71F90-2C6D-44F6-A1F9-0B80B911F8CA}" type="datetimeFigureOut">
               <a:rPr lang="it-IT" smtClean="0"/>
-              <a:t>13/12/2019</a:t>
+              <a:t>16/12/2019</a:t>
             </a:fld>
             <a:endParaRPr lang="it-IT"/>
           </a:p>
@@ -1978,7 +1978,7 @@
           <p:cNvPr id="8" name="Segnaposto piè di pagina 7">
             <a:extLst>
               <a:ext uri="{FF2B5EF4-FFF2-40B4-BE49-F238E27FC236}">
-                <a16:creationId xmlns="" xmlns:a16="http://schemas.microsoft.com/office/drawing/2014/main" id="{6EA02A2F-7388-4F42-A4C6-2A7660ED38E4}"/>
+                <a16:creationId xmlns:a16="http://schemas.microsoft.com/office/drawing/2014/main" xmlns="" id="{6EA02A2F-7388-4F42-A4C6-2A7660ED38E4}"/>
               </a:ext>
             </a:extLst>
           </p:cNvPr>
@@ -2003,7 +2003,7 @@
           <p:cNvPr id="9" name="Segnaposto numero diapositiva 8">
             <a:extLst>
               <a:ext uri="{FF2B5EF4-FFF2-40B4-BE49-F238E27FC236}">
-                <a16:creationId xmlns="" xmlns:a16="http://schemas.microsoft.com/office/drawing/2014/main" id="{CB48DB9B-4650-4AD2-89EF-29E9A37B5E48}"/>
+                <a16:creationId xmlns:a16="http://schemas.microsoft.com/office/drawing/2014/main" xmlns="" id="{CB48DB9B-4650-4AD2-89EF-29E9A37B5E48}"/>
               </a:ext>
             </a:extLst>
           </p:cNvPr>
@@ -2062,7 +2062,7 @@
           <p:cNvPr id="2" name="Titolo 1">
             <a:extLst>
               <a:ext uri="{FF2B5EF4-FFF2-40B4-BE49-F238E27FC236}">
-                <a16:creationId xmlns="" xmlns:a16="http://schemas.microsoft.com/office/drawing/2014/main" id="{7FEFC453-E380-4034-875E-863F49914714}"/>
+                <a16:creationId xmlns:a16="http://schemas.microsoft.com/office/drawing/2014/main" xmlns="" id="{7FEFC453-E380-4034-875E-863F49914714}"/>
               </a:ext>
             </a:extLst>
           </p:cNvPr>
@@ -2090,7 +2090,7 @@
           <p:cNvPr id="3" name="Segnaposto data 2">
             <a:extLst>
               <a:ext uri="{FF2B5EF4-FFF2-40B4-BE49-F238E27FC236}">
-                <a16:creationId xmlns="" xmlns:a16="http://schemas.microsoft.com/office/drawing/2014/main" id="{5BC16F08-373A-43EF-8FBC-2D846E43D6B9}"/>
+                <a16:creationId xmlns:a16="http://schemas.microsoft.com/office/drawing/2014/main" xmlns="" id="{5BC16F08-373A-43EF-8FBC-2D846E43D6B9}"/>
               </a:ext>
             </a:extLst>
           </p:cNvPr>
@@ -2108,7 +2108,7 @@
           <a:p>
             <a:fld id="{F7D71F90-2C6D-44F6-A1F9-0B80B911F8CA}" type="datetimeFigureOut">
               <a:rPr lang="it-IT" smtClean="0"/>
-              <a:t>13/12/2019</a:t>
+              <a:t>16/12/2019</a:t>
             </a:fld>
             <a:endParaRPr lang="it-IT"/>
           </a:p>
@@ -2119,7 +2119,7 @@
           <p:cNvPr id="4" name="Segnaposto piè di pagina 3">
             <a:extLst>
               <a:ext uri="{FF2B5EF4-FFF2-40B4-BE49-F238E27FC236}">
-                <a16:creationId xmlns="" xmlns:a16="http://schemas.microsoft.com/office/drawing/2014/main" id="{2A78CDAE-3535-434E-BF92-560FEDD6C387}"/>
+                <a16:creationId xmlns:a16="http://schemas.microsoft.com/office/drawing/2014/main" xmlns="" id="{2A78CDAE-3535-434E-BF92-560FEDD6C387}"/>
               </a:ext>
             </a:extLst>
           </p:cNvPr>
@@ -2144,7 +2144,7 @@
           <p:cNvPr id="5" name="Segnaposto numero diapositiva 4">
             <a:extLst>
               <a:ext uri="{FF2B5EF4-FFF2-40B4-BE49-F238E27FC236}">
-                <a16:creationId xmlns="" xmlns:a16="http://schemas.microsoft.com/office/drawing/2014/main" id="{FAD2588D-B079-4FE5-B454-629CF3E310A3}"/>
+                <a16:creationId xmlns:a16="http://schemas.microsoft.com/office/drawing/2014/main" xmlns="" id="{FAD2588D-B079-4FE5-B454-629CF3E310A3}"/>
               </a:ext>
             </a:extLst>
           </p:cNvPr>
@@ -2203,7 +2203,7 @@
           <p:cNvPr id="2" name="Segnaposto data 1">
             <a:extLst>
               <a:ext uri="{FF2B5EF4-FFF2-40B4-BE49-F238E27FC236}">
-                <a16:creationId xmlns="" xmlns:a16="http://schemas.microsoft.com/office/drawing/2014/main" id="{D9E26DD7-8914-4A23-85B9-0C03B3ACA40C}"/>
+                <a16:creationId xmlns:a16="http://schemas.microsoft.com/office/drawing/2014/main" xmlns="" id="{D9E26DD7-8914-4A23-85B9-0C03B3ACA40C}"/>
               </a:ext>
             </a:extLst>
           </p:cNvPr>
@@ -2221,7 +2221,7 @@
           <a:p>
             <a:fld id="{F7D71F90-2C6D-44F6-A1F9-0B80B911F8CA}" type="datetimeFigureOut">
               <a:rPr lang="it-IT" smtClean="0"/>
-              <a:t>13/12/2019</a:t>
+              <a:t>16/12/2019</a:t>
             </a:fld>
             <a:endParaRPr lang="it-IT"/>
           </a:p>
@@ -2232,7 +2232,7 @@
           <p:cNvPr id="3" name="Segnaposto piè di pagina 2">
             <a:extLst>
               <a:ext uri="{FF2B5EF4-FFF2-40B4-BE49-F238E27FC236}">
-                <a16:creationId xmlns="" xmlns:a16="http://schemas.microsoft.com/office/drawing/2014/main" id="{992E87C0-E01E-4B5D-B829-69CEB0DB0D77}"/>
+                <a16:creationId xmlns:a16="http://schemas.microsoft.com/office/drawing/2014/main" xmlns="" id="{992E87C0-E01E-4B5D-B829-69CEB0DB0D77}"/>
               </a:ext>
             </a:extLst>
           </p:cNvPr>
@@ -2257,7 +2257,7 @@
           <p:cNvPr id="4" name="Segnaposto numero diapositiva 3">
             <a:extLst>
               <a:ext uri="{FF2B5EF4-FFF2-40B4-BE49-F238E27FC236}">
-                <a16:creationId xmlns="" xmlns:a16="http://schemas.microsoft.com/office/drawing/2014/main" id="{F7867DD9-A762-457F-A406-B864D98AA788}"/>
+                <a16:creationId xmlns:a16="http://schemas.microsoft.com/office/drawing/2014/main" xmlns="" id="{F7867DD9-A762-457F-A406-B864D98AA788}"/>
               </a:ext>
             </a:extLst>
           </p:cNvPr>
@@ -2316,7 +2316,7 @@
           <p:cNvPr id="2" name="Titolo 1">
             <a:extLst>
               <a:ext uri="{FF2B5EF4-FFF2-40B4-BE49-F238E27FC236}">
-                <a16:creationId xmlns="" xmlns:a16="http://schemas.microsoft.com/office/drawing/2014/main" id="{76124E57-2EC1-4A69-8B20-E15B6D22940F}"/>
+                <a16:creationId xmlns:a16="http://schemas.microsoft.com/office/drawing/2014/main" xmlns="" id="{76124E57-2EC1-4A69-8B20-E15B6D22940F}"/>
               </a:ext>
             </a:extLst>
           </p:cNvPr>
@@ -2353,7 +2353,7 @@
           <p:cNvPr id="3" name="Segnaposto contenuto 2">
             <a:extLst>
               <a:ext uri="{FF2B5EF4-FFF2-40B4-BE49-F238E27FC236}">
-                <a16:creationId xmlns="" xmlns:a16="http://schemas.microsoft.com/office/drawing/2014/main" id="{734D8066-1E08-4CE8-983F-9BBA87274CC7}"/>
+                <a16:creationId xmlns:a16="http://schemas.microsoft.com/office/drawing/2014/main" xmlns="" id="{734D8066-1E08-4CE8-983F-9BBA87274CC7}"/>
               </a:ext>
             </a:extLst>
           </p:cNvPr>
@@ -2443,7 +2443,7 @@
           <p:cNvPr id="4" name="Segnaposto testo 3">
             <a:extLst>
               <a:ext uri="{FF2B5EF4-FFF2-40B4-BE49-F238E27FC236}">
-                <a16:creationId xmlns="" xmlns:a16="http://schemas.microsoft.com/office/drawing/2014/main" id="{F3FA6396-D906-40C8-AE24-510E2F78C7FE}"/>
+                <a16:creationId xmlns:a16="http://schemas.microsoft.com/office/drawing/2014/main" xmlns="" id="{F3FA6396-D906-40C8-AE24-510E2F78C7FE}"/>
               </a:ext>
             </a:extLst>
           </p:cNvPr>
@@ -2514,7 +2514,7 @@
           <p:cNvPr id="5" name="Segnaposto data 4">
             <a:extLst>
               <a:ext uri="{FF2B5EF4-FFF2-40B4-BE49-F238E27FC236}">
-                <a16:creationId xmlns="" xmlns:a16="http://schemas.microsoft.com/office/drawing/2014/main" id="{BAA5942A-3BCE-4482-8A5C-CD97772E8976}"/>
+                <a16:creationId xmlns:a16="http://schemas.microsoft.com/office/drawing/2014/main" xmlns="" id="{BAA5942A-3BCE-4482-8A5C-CD97772E8976}"/>
               </a:ext>
             </a:extLst>
           </p:cNvPr>
@@ -2532,7 +2532,7 @@
           <a:p>
             <a:fld id="{F7D71F90-2C6D-44F6-A1F9-0B80B911F8CA}" type="datetimeFigureOut">
               <a:rPr lang="it-IT" smtClean="0"/>
-              <a:t>13/12/2019</a:t>
+              <a:t>16/12/2019</a:t>
             </a:fld>
             <a:endParaRPr lang="it-IT"/>
           </a:p>
@@ -2543,7 +2543,7 @@
           <p:cNvPr id="6" name="Segnaposto piè di pagina 5">
             <a:extLst>
               <a:ext uri="{FF2B5EF4-FFF2-40B4-BE49-F238E27FC236}">
-                <a16:creationId xmlns="" xmlns:a16="http://schemas.microsoft.com/office/drawing/2014/main" id="{99420126-9AFA-4777-BFF5-366C09F8B32E}"/>
+                <a16:creationId xmlns:a16="http://schemas.microsoft.com/office/drawing/2014/main" xmlns="" id="{99420126-9AFA-4777-BFF5-366C09F8B32E}"/>
               </a:ext>
             </a:extLst>
           </p:cNvPr>
@@ -2568,7 +2568,7 @@
           <p:cNvPr id="7" name="Segnaposto numero diapositiva 6">
             <a:extLst>
               <a:ext uri="{FF2B5EF4-FFF2-40B4-BE49-F238E27FC236}">
-                <a16:creationId xmlns="" xmlns:a16="http://schemas.microsoft.com/office/drawing/2014/main" id="{87996299-B8B2-4606-A686-94BC7B31D834}"/>
+                <a16:creationId xmlns:a16="http://schemas.microsoft.com/office/drawing/2014/main" xmlns="" id="{87996299-B8B2-4606-A686-94BC7B31D834}"/>
               </a:ext>
             </a:extLst>
           </p:cNvPr>
@@ -2627,7 +2627,7 @@
           <p:cNvPr id="2" name="Titolo 1">
             <a:extLst>
               <a:ext uri="{FF2B5EF4-FFF2-40B4-BE49-F238E27FC236}">
-                <a16:creationId xmlns="" xmlns:a16="http://schemas.microsoft.com/office/drawing/2014/main" id="{B966293D-979C-4064-9F2B-6124C51E68FE}"/>
+                <a16:creationId xmlns:a16="http://schemas.microsoft.com/office/drawing/2014/main" xmlns="" id="{B966293D-979C-4064-9F2B-6124C51E68FE}"/>
               </a:ext>
             </a:extLst>
           </p:cNvPr>
@@ -2664,7 +2664,7 @@
           <p:cNvPr id="3" name="Segnaposto immagine 2">
             <a:extLst>
               <a:ext uri="{FF2B5EF4-FFF2-40B4-BE49-F238E27FC236}">
-                <a16:creationId xmlns="" xmlns:a16="http://schemas.microsoft.com/office/drawing/2014/main" id="{6A8C2EA0-142A-454E-BAAB-7C4485D60299}"/>
+                <a16:creationId xmlns:a16="http://schemas.microsoft.com/office/drawing/2014/main" xmlns="" id="{6A8C2EA0-142A-454E-BAAB-7C4485D60299}"/>
               </a:ext>
             </a:extLst>
           </p:cNvPr>
@@ -2731,7 +2731,7 @@
           <p:cNvPr id="4" name="Segnaposto testo 3">
             <a:extLst>
               <a:ext uri="{FF2B5EF4-FFF2-40B4-BE49-F238E27FC236}">
-                <a16:creationId xmlns="" xmlns:a16="http://schemas.microsoft.com/office/drawing/2014/main" id="{41AB84A7-19D9-44FE-8513-77CAF35AA7C2}"/>
+                <a16:creationId xmlns:a16="http://schemas.microsoft.com/office/drawing/2014/main" xmlns="" id="{41AB84A7-19D9-44FE-8513-77CAF35AA7C2}"/>
               </a:ext>
             </a:extLst>
           </p:cNvPr>
@@ -2802,7 +2802,7 @@
           <p:cNvPr id="5" name="Segnaposto data 4">
             <a:extLst>
               <a:ext uri="{FF2B5EF4-FFF2-40B4-BE49-F238E27FC236}">
-                <a16:creationId xmlns="" xmlns:a16="http://schemas.microsoft.com/office/drawing/2014/main" id="{8BE837FD-91EA-47CC-A6A0-F23A450D108C}"/>
+                <a16:creationId xmlns:a16="http://schemas.microsoft.com/office/drawing/2014/main" xmlns="" id="{8BE837FD-91EA-47CC-A6A0-F23A450D108C}"/>
               </a:ext>
             </a:extLst>
           </p:cNvPr>
@@ -2820,7 +2820,7 @@
           <a:p>
             <a:fld id="{F7D71F90-2C6D-44F6-A1F9-0B80B911F8CA}" type="datetimeFigureOut">
               <a:rPr lang="it-IT" smtClean="0"/>
-              <a:t>13/12/2019</a:t>
+              <a:t>16/12/2019</a:t>
             </a:fld>
             <a:endParaRPr lang="it-IT"/>
           </a:p>
@@ -2831,7 +2831,7 @@
           <p:cNvPr id="6" name="Segnaposto piè di pagina 5">
             <a:extLst>
               <a:ext uri="{FF2B5EF4-FFF2-40B4-BE49-F238E27FC236}">
-                <a16:creationId xmlns="" xmlns:a16="http://schemas.microsoft.com/office/drawing/2014/main" id="{81B3C88D-C08B-4A45-BF0D-04C3264EB32A}"/>
+                <a16:creationId xmlns:a16="http://schemas.microsoft.com/office/drawing/2014/main" xmlns="" id="{81B3C88D-C08B-4A45-BF0D-04C3264EB32A}"/>
               </a:ext>
             </a:extLst>
           </p:cNvPr>
@@ -2856,7 +2856,7 @@
           <p:cNvPr id="7" name="Segnaposto numero diapositiva 6">
             <a:extLst>
               <a:ext uri="{FF2B5EF4-FFF2-40B4-BE49-F238E27FC236}">
-                <a16:creationId xmlns="" xmlns:a16="http://schemas.microsoft.com/office/drawing/2014/main" id="{C35DA505-C2B5-4A20-A0ED-32D6B7B4CE44}"/>
+                <a16:creationId xmlns:a16="http://schemas.microsoft.com/office/drawing/2014/main" xmlns="" id="{C35DA505-C2B5-4A20-A0ED-32D6B7B4CE44}"/>
               </a:ext>
             </a:extLst>
           </p:cNvPr>
@@ -2920,7 +2920,7 @@
           <p:cNvPr id="2" name="Segnaposto titolo 1">
             <a:extLst>
               <a:ext uri="{FF2B5EF4-FFF2-40B4-BE49-F238E27FC236}">
-                <a16:creationId xmlns="" xmlns:a16="http://schemas.microsoft.com/office/drawing/2014/main" id="{4B1D921F-2C48-4285-A8BD-792591D929C6}"/>
+                <a16:creationId xmlns:a16="http://schemas.microsoft.com/office/drawing/2014/main" xmlns="" id="{4B1D921F-2C48-4285-A8BD-792591D929C6}"/>
               </a:ext>
             </a:extLst>
           </p:cNvPr>
@@ -2958,7 +2958,7 @@
           <p:cNvPr id="3" name="Segnaposto testo 2">
             <a:extLst>
               <a:ext uri="{FF2B5EF4-FFF2-40B4-BE49-F238E27FC236}">
-                <a16:creationId xmlns="" xmlns:a16="http://schemas.microsoft.com/office/drawing/2014/main" id="{518CFD04-AD80-4442-9D20-77C3C390CCFF}"/>
+                <a16:creationId xmlns:a16="http://schemas.microsoft.com/office/drawing/2014/main" xmlns="" id="{518CFD04-AD80-4442-9D20-77C3C390CCFF}"/>
               </a:ext>
             </a:extLst>
           </p:cNvPr>
@@ -3025,7 +3025,7 @@
           <p:cNvPr id="4" name="Segnaposto data 3">
             <a:extLst>
               <a:ext uri="{FF2B5EF4-FFF2-40B4-BE49-F238E27FC236}">
-                <a16:creationId xmlns="" xmlns:a16="http://schemas.microsoft.com/office/drawing/2014/main" id="{2D1ACE57-994B-471D-A0C5-61CE109C7E59}"/>
+                <a16:creationId xmlns:a16="http://schemas.microsoft.com/office/drawing/2014/main" xmlns="" id="{2D1ACE57-994B-471D-A0C5-61CE109C7E59}"/>
               </a:ext>
             </a:extLst>
           </p:cNvPr>
@@ -3061,7 +3061,7 @@
           <a:p>
             <a:fld id="{F7D71F90-2C6D-44F6-A1F9-0B80B911F8CA}" type="datetimeFigureOut">
               <a:rPr lang="it-IT" smtClean="0"/>
-              <a:t>13/12/2019</a:t>
+              <a:t>16/12/2019</a:t>
             </a:fld>
             <a:endParaRPr lang="it-IT"/>
           </a:p>
@@ -3072,7 +3072,7 @@
           <p:cNvPr id="5" name="Segnaposto piè di pagina 4">
             <a:extLst>
               <a:ext uri="{FF2B5EF4-FFF2-40B4-BE49-F238E27FC236}">
-                <a16:creationId xmlns="" xmlns:a16="http://schemas.microsoft.com/office/drawing/2014/main" id="{311C4A1E-1E5A-4141-9735-E37F71E2C7B0}"/>
+                <a16:creationId xmlns:a16="http://schemas.microsoft.com/office/drawing/2014/main" xmlns="" id="{311C4A1E-1E5A-4141-9735-E37F71E2C7B0}"/>
               </a:ext>
             </a:extLst>
           </p:cNvPr>
@@ -3115,7 +3115,7 @@
           <p:cNvPr id="6" name="Segnaposto numero diapositiva 5">
             <a:extLst>
               <a:ext uri="{FF2B5EF4-FFF2-40B4-BE49-F238E27FC236}">
-                <a16:creationId xmlns="" xmlns:a16="http://schemas.microsoft.com/office/drawing/2014/main" id="{5C64D511-420E-43E5-BCD4-81BC958B8929}"/>
+                <a16:creationId xmlns:a16="http://schemas.microsoft.com/office/drawing/2014/main" xmlns="" id="{5C64D511-420E-43E5-BCD4-81BC958B8929}"/>
               </a:ext>
             </a:extLst>
           </p:cNvPr>
@@ -3491,10 +3491,10 @@
           <p:cNvPr id="8" name="Rectangle 7">
             <a:extLst>
               <a:ext uri="{FF2B5EF4-FFF2-40B4-BE49-F238E27FC236}">
-                <a16:creationId xmlns="" xmlns:a16="http://schemas.microsoft.com/office/drawing/2014/main" id="{23962611-DFD5-4092-AAFD-559E3DFCE2C9}"/>
+                <a16:creationId xmlns:a16="http://schemas.microsoft.com/office/drawing/2014/main" xmlns="" id="{23962611-DFD5-4092-AAFD-559E3DFCE2C9}"/>
               </a:ext>
               <a:ext uri="{C183D7F6-B498-43B3-948B-1728B52AA6E4}">
-                <adec:decorative xmlns="" xmlns:adec="http://schemas.microsoft.com/office/drawing/2017/decorative" val="1"/>
+                <adec:decorative xmlns:adec="http://schemas.microsoft.com/office/drawing/2017/decorative" xmlns="" val="1"/>
               </a:ext>
             </a:extLst>
           </p:cNvPr>
@@ -3504,7 +3504,7 @@
           <p:nvPr>
             <p:extLst>
               <p:ext uri="{386F3935-93C4-4BCD-93E2-E3B085C9AB24}">
-                <p16:designElem xmlns="" xmlns:p16="http://schemas.microsoft.com/office/powerpoint/2015/main" val="1"/>
+                <p16:designElem xmlns:p16="http://schemas.microsoft.com/office/powerpoint/2015/main" xmlns="" val="1"/>
               </p:ext>
             </p:extLst>
           </p:nvPr>
@@ -3576,10 +3576,10 @@
           <p:cNvPr id="10" name="Picture 9">
             <a:extLst>
               <a:ext uri="{FF2B5EF4-FFF2-40B4-BE49-F238E27FC236}">
-                <a16:creationId xmlns="" xmlns:a16="http://schemas.microsoft.com/office/drawing/2014/main" id="{2270F1FA-0425-408F-9861-80BF5AFB276D}"/>
+                <a16:creationId xmlns:a16="http://schemas.microsoft.com/office/drawing/2014/main" xmlns="" id="{2270F1FA-0425-408F-9861-80BF5AFB276D}"/>
               </a:ext>
               <a:ext uri="{C183D7F6-B498-43B3-948B-1728B52AA6E4}">
-                <adec:decorative xmlns="" xmlns:adec="http://schemas.microsoft.com/office/drawing/2017/decorative" val="1"/>
+                <adec:decorative xmlns:adec="http://schemas.microsoft.com/office/drawing/2017/decorative" xmlns="" val="1"/>
               </a:ext>
             </a:extLst>
           </p:cNvPr>
@@ -3589,7 +3589,7 @@
           <p:nvPr>
             <p:extLst>
               <p:ext uri="{386F3935-93C4-4BCD-93E2-E3B085C9AB24}">
-                <p16:designElem xmlns="" xmlns:p16="http://schemas.microsoft.com/office/powerpoint/2015/main" val="1"/>
+                <p16:designElem xmlns:p16="http://schemas.microsoft.com/office/powerpoint/2015/main" xmlns="" val="1"/>
               </p:ext>
             </p:extLst>
           </p:nvPr>
@@ -3621,7 +3621,7 @@
           <p:cNvPr id="2" name="Titolo 1">
             <a:extLst>
               <a:ext uri="{FF2B5EF4-FFF2-40B4-BE49-F238E27FC236}">
-                <a16:creationId xmlns="" xmlns:a16="http://schemas.microsoft.com/office/drawing/2014/main" id="{DCBAC149-DB9F-4874-BC24-7F077AA4B78D}"/>
+                <a16:creationId xmlns:a16="http://schemas.microsoft.com/office/drawing/2014/main" xmlns="" id="{DCBAC149-DB9F-4874-BC24-7F077AA4B78D}"/>
               </a:ext>
             </a:extLst>
           </p:cNvPr>
@@ -3665,7 +3665,7 @@
           <p:cNvPr id="3" name="Sottotitolo 2">
             <a:extLst>
               <a:ext uri="{FF2B5EF4-FFF2-40B4-BE49-F238E27FC236}">
-                <a16:creationId xmlns="" xmlns:a16="http://schemas.microsoft.com/office/drawing/2014/main" id="{B9F686C4-B595-4CDD-8233-91A53C48A369}"/>
+                <a16:creationId xmlns:a16="http://schemas.microsoft.com/office/drawing/2014/main" xmlns="" id="{B9F686C4-B595-4CDD-8233-91A53C48A369}"/>
               </a:ext>
             </a:extLst>
           </p:cNvPr>
@@ -3734,7 +3734,7 @@
           <p:cNvPr id="2" name="Titolo 1">
             <a:extLst>
               <a:ext uri="{FF2B5EF4-FFF2-40B4-BE49-F238E27FC236}">
-                <a16:creationId xmlns="" xmlns:a16="http://schemas.microsoft.com/office/drawing/2014/main" id="{B7EC37DD-9E0C-4C6E-A811-00302AD6EACB}"/>
+                <a16:creationId xmlns:a16="http://schemas.microsoft.com/office/drawing/2014/main" xmlns="" id="{B7EC37DD-9E0C-4C6E-A811-00302AD6EACB}"/>
               </a:ext>
             </a:extLst>
           </p:cNvPr>
@@ -3767,7 +3767,7 @@
           <p:cNvPr id="4" name="Tabella 4">
             <a:extLst>
               <a:ext uri="{FF2B5EF4-FFF2-40B4-BE49-F238E27FC236}">
-                <a16:creationId xmlns="" xmlns:a16="http://schemas.microsoft.com/office/drawing/2014/main" id="{043F75E0-1B48-4C2E-8ADF-C8441714A81A}"/>
+                <a16:creationId xmlns:a16="http://schemas.microsoft.com/office/drawing/2014/main" xmlns="" id="{043F75E0-1B48-4C2E-8ADF-C8441714A81A}"/>
               </a:ext>
             </a:extLst>
           </p:cNvPr>
@@ -3797,14 +3797,14 @@
                 <a:gridCol w="2483498">
                   <a:extLst>
                     <a:ext uri="{9D8B030D-6E8A-4147-A177-3AD203B41FA5}">
-                      <a16:colId xmlns="" xmlns:a16="http://schemas.microsoft.com/office/drawing/2014/main" val="414173828"/>
+                      <a16:colId xmlns:a16="http://schemas.microsoft.com/office/drawing/2014/main" xmlns="" val="414173828"/>
                     </a:ext>
                   </a:extLst>
                 </a:gridCol>
                 <a:gridCol w="8032102">
                   <a:extLst>
                     <a:ext uri="{9D8B030D-6E8A-4147-A177-3AD203B41FA5}">
-                      <a16:colId xmlns="" xmlns:a16="http://schemas.microsoft.com/office/drawing/2014/main" val="418542194"/>
+                      <a16:colId xmlns:a16="http://schemas.microsoft.com/office/drawing/2014/main" xmlns="" val="418542194"/>
                     </a:ext>
                   </a:extLst>
                 </a:gridCol>
@@ -3839,7 +3839,7 @@
                 </a:tc>
                 <a:extLst>
                   <a:ext uri="{0D108BD9-81ED-4DB2-BD59-A6C34878D82A}">
-                    <a16:rowId xmlns="" xmlns:a16="http://schemas.microsoft.com/office/drawing/2014/main" val="246340804"/>
+                    <a16:rowId xmlns:a16="http://schemas.microsoft.com/office/drawing/2014/main" xmlns="" val="246340804"/>
                   </a:ext>
                 </a:extLst>
               </a:tr>
@@ -3873,7 +3873,7 @@
                 </a:tc>
                 <a:extLst>
                   <a:ext uri="{0D108BD9-81ED-4DB2-BD59-A6C34878D82A}">
-                    <a16:rowId xmlns="" xmlns:a16="http://schemas.microsoft.com/office/drawing/2014/main" val="2368987764"/>
+                    <a16:rowId xmlns:a16="http://schemas.microsoft.com/office/drawing/2014/main" xmlns="" val="2368987764"/>
                   </a:ext>
                 </a:extLst>
               </a:tr>
@@ -3907,7 +3907,7 @@
                 </a:tc>
                 <a:extLst>
                   <a:ext uri="{0D108BD9-81ED-4DB2-BD59-A6C34878D82A}">
-                    <a16:rowId xmlns="" xmlns:a16="http://schemas.microsoft.com/office/drawing/2014/main" val="301388857"/>
+                    <a16:rowId xmlns:a16="http://schemas.microsoft.com/office/drawing/2014/main" xmlns="" val="301388857"/>
                   </a:ext>
                 </a:extLst>
               </a:tr>
@@ -3945,7 +3945,7 @@
                 </a:tc>
                 <a:extLst>
                   <a:ext uri="{0D108BD9-81ED-4DB2-BD59-A6C34878D82A}">
-                    <a16:rowId xmlns="" xmlns:a16="http://schemas.microsoft.com/office/drawing/2014/main" val="2333084500"/>
+                    <a16:rowId xmlns:a16="http://schemas.microsoft.com/office/drawing/2014/main" xmlns="" val="2333084500"/>
                   </a:ext>
                 </a:extLst>
               </a:tr>
@@ -3979,7 +3979,7 @@
                 </a:tc>
                 <a:extLst>
                   <a:ext uri="{0D108BD9-81ED-4DB2-BD59-A6C34878D82A}">
-                    <a16:rowId xmlns="" xmlns:a16="http://schemas.microsoft.com/office/drawing/2014/main" val="2773735045"/>
+                    <a16:rowId xmlns:a16="http://schemas.microsoft.com/office/drawing/2014/main" xmlns="" val="2773735045"/>
                   </a:ext>
                 </a:extLst>
               </a:tr>
@@ -4017,7 +4017,7 @@
                 </a:tc>
                 <a:extLst>
                   <a:ext uri="{0D108BD9-81ED-4DB2-BD59-A6C34878D82A}">
-                    <a16:rowId xmlns="" xmlns:a16="http://schemas.microsoft.com/office/drawing/2014/main" val="3315426333"/>
+                    <a16:rowId xmlns:a16="http://schemas.microsoft.com/office/drawing/2014/main" xmlns="" val="3315426333"/>
                   </a:ext>
                 </a:extLst>
               </a:tr>
@@ -4051,7 +4051,7 @@
                 </a:tc>
                 <a:extLst>
                   <a:ext uri="{0D108BD9-81ED-4DB2-BD59-A6C34878D82A}">
-                    <a16:rowId xmlns="" xmlns:a16="http://schemas.microsoft.com/office/drawing/2014/main" val="833276135"/>
+                    <a16:rowId xmlns:a16="http://schemas.microsoft.com/office/drawing/2014/main" xmlns="" val="833276135"/>
                   </a:ext>
                 </a:extLst>
               </a:tr>
@@ -4085,7 +4085,7 @@
                 </a:tc>
                 <a:extLst>
                   <a:ext uri="{0D108BD9-81ED-4DB2-BD59-A6C34878D82A}">
-                    <a16:rowId xmlns="" xmlns:a16="http://schemas.microsoft.com/office/drawing/2014/main" val="1615278520"/>
+                    <a16:rowId xmlns:a16="http://schemas.microsoft.com/office/drawing/2014/main" xmlns="" val="1615278520"/>
                   </a:ext>
                 </a:extLst>
               </a:tr>
@@ -4098,7 +4098,7 @@
           <p:cNvPr id="7" name="Elemento grafico 6" descr="Informazioni">
             <a:extLst>
               <a:ext uri="{FF2B5EF4-FFF2-40B4-BE49-F238E27FC236}">
-                <a16:creationId xmlns="" xmlns:a16="http://schemas.microsoft.com/office/drawing/2014/main" id="{53D936C3-6DDC-4194-987E-7AE9EFD9723F}"/>
+                <a16:creationId xmlns:a16="http://schemas.microsoft.com/office/drawing/2014/main" xmlns="" id="{53D936C3-6DDC-4194-987E-7AE9EFD9723F}"/>
               </a:ext>
             </a:extLst>
           </p:cNvPr>
@@ -4114,7 +4114,7 @@
                 <a14:useLocalDpi xmlns:a14="http://schemas.microsoft.com/office/drawing/2010/main" val="0"/>
               </a:ext>
               <a:ext uri="{96DAC541-7B7A-43D3-8B79-37D633B846F1}">
-                <asvg:svgBlip xmlns="" xmlns:asvg="http://schemas.microsoft.com/office/drawing/2016/SVG/main" r:embed="rId3"/>
+                <asvg:svgBlip xmlns:asvg="http://schemas.microsoft.com/office/drawing/2016/SVG/main" xmlns="" r:embed="rId3"/>
               </a:ext>
             </a:extLst>
           </a:blip>
@@ -4167,7 +4167,7 @@
           <p:cNvPr id="2" name="Titolo 1">
             <a:extLst>
               <a:ext uri="{FF2B5EF4-FFF2-40B4-BE49-F238E27FC236}">
-                <a16:creationId xmlns="" xmlns:a16="http://schemas.microsoft.com/office/drawing/2014/main" id="{FF61BD71-50E0-44C1-A558-965A7ABC70AD}"/>
+                <a16:creationId xmlns:a16="http://schemas.microsoft.com/office/drawing/2014/main" xmlns="" id="{FF61BD71-50E0-44C1-A558-965A7ABC70AD}"/>
               </a:ext>
             </a:extLst>
           </p:cNvPr>
@@ -4195,7 +4195,7 @@
           <p:cNvPr id="4" name="Tabella 4">
             <a:extLst>
               <a:ext uri="{FF2B5EF4-FFF2-40B4-BE49-F238E27FC236}">
-                <a16:creationId xmlns="" xmlns:a16="http://schemas.microsoft.com/office/drawing/2014/main" id="{0BC89AA1-366F-4BE5-824E-0153DB6DF5C3}"/>
+                <a16:creationId xmlns:a16="http://schemas.microsoft.com/office/drawing/2014/main" xmlns="" id="{0BC89AA1-366F-4BE5-824E-0153DB6DF5C3}"/>
               </a:ext>
             </a:extLst>
           </p:cNvPr>
@@ -4225,14 +4225,14 @@
                 <a:gridCol w="2866053">
                   <a:extLst>
                     <a:ext uri="{9D8B030D-6E8A-4147-A177-3AD203B41FA5}">
-                      <a16:colId xmlns="" xmlns:a16="http://schemas.microsoft.com/office/drawing/2014/main" val="3900888184"/>
+                      <a16:colId xmlns:a16="http://schemas.microsoft.com/office/drawing/2014/main" xmlns="" val="3900888184"/>
                     </a:ext>
                   </a:extLst>
                 </a:gridCol>
                 <a:gridCol w="7649547">
                   <a:extLst>
                     <a:ext uri="{9D8B030D-6E8A-4147-A177-3AD203B41FA5}">
-                      <a16:colId xmlns="" xmlns:a16="http://schemas.microsoft.com/office/drawing/2014/main" val="2392364571"/>
+                      <a16:colId xmlns:a16="http://schemas.microsoft.com/office/drawing/2014/main" xmlns="" val="2392364571"/>
                     </a:ext>
                   </a:extLst>
                 </a:gridCol>
@@ -4271,7 +4271,7 @@
                 </a:tc>
                 <a:extLst>
                   <a:ext uri="{0D108BD9-81ED-4DB2-BD59-A6C34878D82A}">
-                    <a16:rowId xmlns="" xmlns:a16="http://schemas.microsoft.com/office/drawing/2014/main" val="2750207453"/>
+                    <a16:rowId xmlns:a16="http://schemas.microsoft.com/office/drawing/2014/main" xmlns="" val="2750207453"/>
                   </a:ext>
                 </a:extLst>
               </a:tr>
@@ -4309,7 +4309,7 @@
                 </a:tc>
                 <a:extLst>
                   <a:ext uri="{0D108BD9-81ED-4DB2-BD59-A6C34878D82A}">
-                    <a16:rowId xmlns="" xmlns:a16="http://schemas.microsoft.com/office/drawing/2014/main" val="43365482"/>
+                    <a16:rowId xmlns:a16="http://schemas.microsoft.com/office/drawing/2014/main" xmlns="" val="43365482"/>
                   </a:ext>
                 </a:extLst>
               </a:tr>
@@ -4339,7 +4339,7 @@
                 </a:tc>
                 <a:extLst>
                   <a:ext uri="{0D108BD9-81ED-4DB2-BD59-A6C34878D82A}">
-                    <a16:rowId xmlns="" xmlns:a16="http://schemas.microsoft.com/office/drawing/2014/main" val="1813106428"/>
+                    <a16:rowId xmlns:a16="http://schemas.microsoft.com/office/drawing/2014/main" xmlns="" val="1813106428"/>
                   </a:ext>
                 </a:extLst>
               </a:tr>
@@ -4373,7 +4373,7 @@
                 </a:tc>
                 <a:extLst>
                   <a:ext uri="{0D108BD9-81ED-4DB2-BD59-A6C34878D82A}">
-                    <a16:rowId xmlns="" xmlns:a16="http://schemas.microsoft.com/office/drawing/2014/main" val="4265491522"/>
+                    <a16:rowId xmlns:a16="http://schemas.microsoft.com/office/drawing/2014/main" xmlns="" val="4265491522"/>
                   </a:ext>
                 </a:extLst>
               </a:tr>
@@ -4407,7 +4407,7 @@
                 </a:tc>
                 <a:extLst>
                   <a:ext uri="{0D108BD9-81ED-4DB2-BD59-A6C34878D82A}">
-                    <a16:rowId xmlns="" xmlns:a16="http://schemas.microsoft.com/office/drawing/2014/main" val="1759204447"/>
+                    <a16:rowId xmlns:a16="http://schemas.microsoft.com/office/drawing/2014/main" xmlns="" val="1759204447"/>
                   </a:ext>
                 </a:extLst>
               </a:tr>
@@ -4453,7 +4453,7 @@
                 </a:tc>
                 <a:extLst>
                   <a:ext uri="{0D108BD9-81ED-4DB2-BD59-A6C34878D82A}">
-                    <a16:rowId xmlns="" xmlns:a16="http://schemas.microsoft.com/office/drawing/2014/main" val="4176074482"/>
+                    <a16:rowId xmlns:a16="http://schemas.microsoft.com/office/drawing/2014/main" xmlns="" val="4176074482"/>
                   </a:ext>
                 </a:extLst>
               </a:tr>
@@ -4487,7 +4487,7 @@
                 </a:tc>
                 <a:extLst>
                   <a:ext uri="{0D108BD9-81ED-4DB2-BD59-A6C34878D82A}">
-                    <a16:rowId xmlns="" xmlns:a16="http://schemas.microsoft.com/office/drawing/2014/main" val="2176725863"/>
+                    <a16:rowId xmlns:a16="http://schemas.microsoft.com/office/drawing/2014/main" xmlns="" val="2176725863"/>
                   </a:ext>
                 </a:extLst>
               </a:tr>
@@ -4500,7 +4500,7 @@
           <p:cNvPr id="7" name="Elemento grafico 6" descr="Alta tensione">
             <a:extLst>
               <a:ext uri="{FF2B5EF4-FFF2-40B4-BE49-F238E27FC236}">
-                <a16:creationId xmlns="" xmlns:a16="http://schemas.microsoft.com/office/drawing/2014/main" id="{4BC6B4F9-BBF9-493A-8CEC-E6BC93390131}"/>
+                <a16:creationId xmlns:a16="http://schemas.microsoft.com/office/drawing/2014/main" xmlns="" id="{4BC6B4F9-BBF9-493A-8CEC-E6BC93390131}"/>
               </a:ext>
             </a:extLst>
           </p:cNvPr>
@@ -4516,7 +4516,7 @@
                 <a14:useLocalDpi xmlns:a14="http://schemas.microsoft.com/office/drawing/2010/main" val="0"/>
               </a:ext>
               <a:ext uri="{96DAC541-7B7A-43D3-8B79-37D633B846F1}">
-                <asvg:svgBlip xmlns="" xmlns:asvg="http://schemas.microsoft.com/office/drawing/2016/SVG/main" r:embed="rId3"/>
+                <asvg:svgBlip xmlns:asvg="http://schemas.microsoft.com/office/drawing/2016/SVG/main" xmlns="" r:embed="rId3"/>
               </a:ext>
             </a:extLst>
           </a:blip>
@@ -4569,7 +4569,7 @@
           <p:cNvPr id="2" name="Titolo 1">
             <a:extLst>
               <a:ext uri="{FF2B5EF4-FFF2-40B4-BE49-F238E27FC236}">
-                <a16:creationId xmlns="" xmlns:a16="http://schemas.microsoft.com/office/drawing/2014/main" id="{A8B055A1-B3E5-4E97-BAF3-4C33FEAE38D5}"/>
+                <a16:creationId xmlns:a16="http://schemas.microsoft.com/office/drawing/2014/main" xmlns="" id="{A8B055A1-B3E5-4E97-BAF3-4C33FEAE38D5}"/>
               </a:ext>
             </a:extLst>
           </p:cNvPr>
@@ -4603,7 +4603,7 @@
           <p:cNvPr id="4" name="Tabella 4">
             <a:extLst>
               <a:ext uri="{FF2B5EF4-FFF2-40B4-BE49-F238E27FC236}">
-                <a16:creationId xmlns="" xmlns:a16="http://schemas.microsoft.com/office/drawing/2014/main" id="{67C1CEAA-13A3-482D-AA09-BF3FC903FFE5}"/>
+                <a16:creationId xmlns:a16="http://schemas.microsoft.com/office/drawing/2014/main" xmlns="" id="{67C1CEAA-13A3-482D-AA09-BF3FC903FFE5}"/>
               </a:ext>
             </a:extLst>
           </p:cNvPr>
@@ -4614,14 +4614,14 @@
             <p:ph idx="1"/>
             <p:extLst>
               <p:ext uri="{D42A27DB-BD31-4B8C-83A1-F6EECF244321}">
-                <p14:modId xmlns:p14="http://schemas.microsoft.com/office/powerpoint/2010/main" val="541821283"/>
+                <p14:modId xmlns:p14="http://schemas.microsoft.com/office/powerpoint/2010/main" val="1310163403"/>
               </p:ext>
             </p:extLst>
           </p:nvPr>
         </p:nvGraphicFramePr>
         <p:xfrm>
           <a:off x="838200" y="1825625"/>
-          <a:ext cx="10515600" cy="1381760"/>
+          <a:ext cx="10515600" cy="2199640"/>
         </p:xfrm>
         <a:graphic>
           <a:graphicData uri="http://schemas.openxmlformats.org/drawingml/2006/table">
@@ -4633,14 +4633,14 @@
                 <a:gridCol w="2688771">
                   <a:extLst>
                     <a:ext uri="{9D8B030D-6E8A-4147-A177-3AD203B41FA5}">
-                      <a16:colId xmlns="" xmlns:a16="http://schemas.microsoft.com/office/drawing/2014/main" val="634955233"/>
+                      <a16:colId xmlns:a16="http://schemas.microsoft.com/office/drawing/2014/main" xmlns="" val="634955233"/>
                     </a:ext>
                   </a:extLst>
                 </a:gridCol>
                 <a:gridCol w="7826829">
                   <a:extLst>
                     <a:ext uri="{9D8B030D-6E8A-4147-A177-3AD203B41FA5}">
-                      <a16:colId xmlns="" xmlns:a16="http://schemas.microsoft.com/office/drawing/2014/main" val="1784330953"/>
+                      <a16:colId xmlns:a16="http://schemas.microsoft.com/office/drawing/2014/main" xmlns="" val="1784330953"/>
                     </a:ext>
                   </a:extLst>
                 </a:gridCol>
@@ -4684,7 +4684,25 @@
                       </a:pPr>
                       <a:r>
                         <a:rPr lang="it-IT" baseline="0" dirty="0" smtClean="0"/>
-                        <a:t>Il sistema aggiornerà le news attuali e le mostrerà nella home dell’</a:t>
+                        <a:t>Il sistema aggiornerà le news </a:t>
+                      </a:r>
+                      <a:r>
+                        <a:rPr lang="it-IT" baseline="0" dirty="0" smtClean="0"/>
+                        <a:t>attuali</a:t>
+                      </a:r>
+                    </a:p>
+                    <a:p>
+                      <a:pPr marL="342900" indent="-342900">
+                        <a:buFont typeface="+mj-lt"/>
+                        <a:buAutoNum type="arabicPeriod"/>
+                      </a:pPr>
+                      <a:r>
+                        <a:rPr lang="it-IT" baseline="0" dirty="0" smtClean="0"/>
+                        <a:t>L’applicazione mostrerà le anteprime delle news nella </a:t>
+                      </a:r>
+                      <a:r>
+                        <a:rPr lang="it-IT" baseline="0" dirty="0" smtClean="0"/>
+                        <a:t>home dell’</a:t>
                       </a:r>
                       <a:r>
                         <a:rPr lang="it-IT" baseline="0" dirty="0" err="1" smtClean="0"/>
@@ -4700,7 +4718,7 @@
                 </a:tc>
                 <a:extLst>
                   <a:ext uri="{0D108BD9-81ED-4DB2-BD59-A6C34878D82A}">
-                    <a16:rowId xmlns="" xmlns:a16="http://schemas.microsoft.com/office/drawing/2014/main" val="400559187"/>
+                    <a16:rowId xmlns:a16="http://schemas.microsoft.com/office/drawing/2014/main" xmlns="" val="400559187"/>
                   </a:ext>
                 </a:extLst>
               </a:tr>
@@ -4725,7 +4743,44 @@
                     <a:p>
                       <a:r>
                         <a:rPr lang="it-IT" dirty="0" smtClean="0"/>
-                        <a:t>-</a:t>
+                        <a:t>L’utente accede alla sezione «News» presente nel </a:t>
+                      </a:r>
+                      <a:r>
+                        <a:rPr lang="it-IT" dirty="0" err="1" smtClean="0"/>
+                        <a:t>navigation</a:t>
+                      </a:r>
+                      <a:r>
+                        <a:rPr lang="it-IT" dirty="0" smtClean="0"/>
+                        <a:t> </a:t>
+                      </a:r>
+                      <a:r>
+                        <a:rPr lang="it-IT" dirty="0" err="1" smtClean="0"/>
+                        <a:t>drawer</a:t>
+                      </a:r>
+                      <a:endParaRPr lang="it-IT" dirty="0" smtClean="0"/>
+                    </a:p>
+                    <a:p>
+                      <a:pPr marL="342900" indent="-342900">
+                        <a:buFont typeface="+mj-lt"/>
+                        <a:buAutoNum type="arabicPeriod"/>
+                      </a:pPr>
+                      <a:r>
+                        <a:rPr lang="it-IT" dirty="0" smtClean="0"/>
+                        <a:t>L’applicazione mostra sotto forma di elenco le anteprime delle news</a:t>
+                      </a:r>
+                    </a:p>
+                    <a:p>
+                      <a:pPr marL="342900" indent="-342900">
+                        <a:buFont typeface="+mj-lt"/>
+                        <a:buAutoNum type="arabicPeriod"/>
+                      </a:pPr>
+                      <a:r>
+                        <a:rPr lang="it-IT" dirty="0" smtClean="0"/>
+                        <a:t>Tappando su un’anteprima, verrà mostrata la notizia completa </a:t>
+                      </a:r>
+                      <a:r>
+                        <a:rPr lang="it-IT" smtClean="0"/>
+                        <a:t>sul browser</a:t>
                       </a:r>
                       <a:endParaRPr lang="it-IT" dirty="0"/>
                     </a:p>
@@ -4734,7 +4789,7 @@
                 </a:tc>
                 <a:extLst>
                   <a:ext uri="{0D108BD9-81ED-4DB2-BD59-A6C34878D82A}">
-                    <a16:rowId xmlns="" xmlns:a16="http://schemas.microsoft.com/office/drawing/2014/main" val="286916072"/>
+                    <a16:rowId xmlns:a16="http://schemas.microsoft.com/office/drawing/2014/main" xmlns="" val="286916072"/>
                   </a:ext>
                 </a:extLst>
               </a:tr>
@@ -4768,7 +4823,7 @@
                 </a:tc>
                 <a:extLst>
                   <a:ext uri="{0D108BD9-81ED-4DB2-BD59-A6C34878D82A}">
-                    <a16:rowId xmlns="" xmlns:a16="http://schemas.microsoft.com/office/drawing/2014/main" val="1276537878"/>
+                    <a16:rowId xmlns:a16="http://schemas.microsoft.com/office/drawing/2014/main" xmlns="" val="1276537878"/>
                   </a:ext>
                 </a:extLst>
               </a:tr>
@@ -4781,7 +4836,7 @@
           <p:cNvPr id="8" name="Elemento grafico 7" descr="Flusso di lavoro">
             <a:extLst>
               <a:ext uri="{FF2B5EF4-FFF2-40B4-BE49-F238E27FC236}">
-                <a16:creationId xmlns="" xmlns:a16="http://schemas.microsoft.com/office/drawing/2014/main" id="{A495AF70-8473-45AA-80C8-B98D01FB12D2}"/>
+                <a16:creationId xmlns:a16="http://schemas.microsoft.com/office/drawing/2014/main" xmlns="" id="{A495AF70-8473-45AA-80C8-B98D01FB12D2}"/>
               </a:ext>
             </a:extLst>
           </p:cNvPr>
@@ -4797,7 +4852,7 @@
                 <a14:useLocalDpi xmlns:a14="http://schemas.microsoft.com/office/drawing/2010/main" val="0"/>
               </a:ext>
               <a:ext uri="{96DAC541-7B7A-43D3-8B79-37D633B846F1}">
-                <asvg:svgBlip xmlns="" xmlns:asvg="http://schemas.microsoft.com/office/drawing/2016/SVG/main" r:embed="rId3"/>
+                <asvg:svgBlip xmlns:asvg="http://schemas.microsoft.com/office/drawing/2016/SVG/main" xmlns="" r:embed="rId3"/>
               </a:ext>
             </a:extLst>
           </a:blip>
@@ -5117,7 +5172,7 @@
   <a:extraClrSchemeLst/>
   <a:extLst>
     <a:ext uri="{05A4C25C-085E-4340-85A3-A5531E510DB2}">
-      <thm15:themeFamily xmlns="" xmlns:thm15="http://schemas.microsoft.com/office/thememl/2012/main" name="Office Theme" id="{62F939B6-93AF-4DB8-9C6B-D6C7DFDC589F}" vid="{4A3C46E8-61CC-4603-A589-7422A47A8E4A}"/>
+      <thm15:themeFamily xmlns:thm15="http://schemas.microsoft.com/office/thememl/2012/main" xmlns="" name="Office Theme" id="{62F939B6-93AF-4DB8-9C6B-D6C7DFDC589F}" vid="{4A3C46E8-61CC-4603-A589-7422A47A8E4A}"/>
     </a:ext>
   </a:extLst>
 </a:theme>

</xml_diff>

<commit_message>
Modifica Template use case/Template News.pptx
</commit_message>
<xml_diff>
--- a/docs/analisi/Template use case/Template News.pptx
+++ b/docs/analisi/Template use case/Template News.pptx
@@ -286,7 +286,7 @@
           <p:cNvPr id="2" name="Titolo 1">
             <a:extLst>
               <a:ext uri="{FF2B5EF4-FFF2-40B4-BE49-F238E27FC236}">
-                <a16:creationId xmlns:a16="http://schemas.microsoft.com/office/drawing/2014/main" xmlns="" id="{CFBF2858-9FF9-49F6-9325-A5B5D4185723}"/>
+                <a16:creationId xmlns="" xmlns:a16="http://schemas.microsoft.com/office/drawing/2014/main" id="{CFBF2858-9FF9-49F6-9325-A5B5D4185723}"/>
               </a:ext>
             </a:extLst>
           </p:cNvPr>
@@ -323,7 +323,7 @@
           <p:cNvPr id="3" name="Sottotitolo 2">
             <a:extLst>
               <a:ext uri="{FF2B5EF4-FFF2-40B4-BE49-F238E27FC236}">
-                <a16:creationId xmlns:a16="http://schemas.microsoft.com/office/drawing/2014/main" xmlns="" id="{4B21D84B-ED35-4CD0-B889-7022650B2578}"/>
+                <a16:creationId xmlns="" xmlns:a16="http://schemas.microsoft.com/office/drawing/2014/main" id="{4B21D84B-ED35-4CD0-B889-7022650B2578}"/>
               </a:ext>
             </a:extLst>
           </p:cNvPr>
@@ -393,7 +393,7 @@
           <p:cNvPr id="4" name="Segnaposto data 3">
             <a:extLst>
               <a:ext uri="{FF2B5EF4-FFF2-40B4-BE49-F238E27FC236}">
-                <a16:creationId xmlns:a16="http://schemas.microsoft.com/office/drawing/2014/main" xmlns="" id="{E66C651E-1356-4A58-BA17-ECFD882A1A0D}"/>
+                <a16:creationId xmlns="" xmlns:a16="http://schemas.microsoft.com/office/drawing/2014/main" id="{E66C651E-1356-4A58-BA17-ECFD882A1A0D}"/>
               </a:ext>
             </a:extLst>
           </p:cNvPr>
@@ -422,7 +422,7 @@
           <p:cNvPr id="5" name="Segnaposto piè di pagina 4">
             <a:extLst>
               <a:ext uri="{FF2B5EF4-FFF2-40B4-BE49-F238E27FC236}">
-                <a16:creationId xmlns:a16="http://schemas.microsoft.com/office/drawing/2014/main" xmlns="" id="{74328D79-8461-43BC-84DA-249AF43BC14A}"/>
+                <a16:creationId xmlns="" xmlns:a16="http://schemas.microsoft.com/office/drawing/2014/main" id="{74328D79-8461-43BC-84DA-249AF43BC14A}"/>
               </a:ext>
             </a:extLst>
           </p:cNvPr>
@@ -447,7 +447,7 @@
           <p:cNvPr id="6" name="Segnaposto numero diapositiva 5">
             <a:extLst>
               <a:ext uri="{FF2B5EF4-FFF2-40B4-BE49-F238E27FC236}">
-                <a16:creationId xmlns:a16="http://schemas.microsoft.com/office/drawing/2014/main" xmlns="" id="{816387D6-94E6-47FE-871A-C8EF03F29BDB}"/>
+                <a16:creationId xmlns="" xmlns:a16="http://schemas.microsoft.com/office/drawing/2014/main" id="{816387D6-94E6-47FE-871A-C8EF03F29BDB}"/>
               </a:ext>
             </a:extLst>
           </p:cNvPr>
@@ -506,7 +506,7 @@
           <p:cNvPr id="2" name="Titolo 1">
             <a:extLst>
               <a:ext uri="{FF2B5EF4-FFF2-40B4-BE49-F238E27FC236}">
-                <a16:creationId xmlns:a16="http://schemas.microsoft.com/office/drawing/2014/main" xmlns="" id="{F59AC4B1-2C56-4BBF-A05F-D9500F78FEB9}"/>
+                <a16:creationId xmlns="" xmlns:a16="http://schemas.microsoft.com/office/drawing/2014/main" id="{F59AC4B1-2C56-4BBF-A05F-D9500F78FEB9}"/>
               </a:ext>
             </a:extLst>
           </p:cNvPr>
@@ -534,7 +534,7 @@
           <p:cNvPr id="3" name="Segnaposto testo verticale 2">
             <a:extLst>
               <a:ext uri="{FF2B5EF4-FFF2-40B4-BE49-F238E27FC236}">
-                <a16:creationId xmlns:a16="http://schemas.microsoft.com/office/drawing/2014/main" xmlns="" id="{90389E8C-63A3-42AB-93CD-0F8792454FCC}"/>
+                <a16:creationId xmlns="" xmlns:a16="http://schemas.microsoft.com/office/drawing/2014/main" id="{90389E8C-63A3-42AB-93CD-0F8792454FCC}"/>
               </a:ext>
             </a:extLst>
           </p:cNvPr>
@@ -591,7 +591,7 @@
           <p:cNvPr id="4" name="Segnaposto data 3">
             <a:extLst>
               <a:ext uri="{FF2B5EF4-FFF2-40B4-BE49-F238E27FC236}">
-                <a16:creationId xmlns:a16="http://schemas.microsoft.com/office/drawing/2014/main" xmlns="" id="{254FADA6-B05E-4B35-A06A-2022D2DBEC26}"/>
+                <a16:creationId xmlns="" xmlns:a16="http://schemas.microsoft.com/office/drawing/2014/main" id="{254FADA6-B05E-4B35-A06A-2022D2DBEC26}"/>
               </a:ext>
             </a:extLst>
           </p:cNvPr>
@@ -620,7 +620,7 @@
           <p:cNvPr id="5" name="Segnaposto piè di pagina 4">
             <a:extLst>
               <a:ext uri="{FF2B5EF4-FFF2-40B4-BE49-F238E27FC236}">
-                <a16:creationId xmlns:a16="http://schemas.microsoft.com/office/drawing/2014/main" xmlns="" id="{0631869E-DF6C-4226-B729-2123308FE398}"/>
+                <a16:creationId xmlns="" xmlns:a16="http://schemas.microsoft.com/office/drawing/2014/main" id="{0631869E-DF6C-4226-B729-2123308FE398}"/>
               </a:ext>
             </a:extLst>
           </p:cNvPr>
@@ -645,7 +645,7 @@
           <p:cNvPr id="6" name="Segnaposto numero diapositiva 5">
             <a:extLst>
               <a:ext uri="{FF2B5EF4-FFF2-40B4-BE49-F238E27FC236}">
-                <a16:creationId xmlns:a16="http://schemas.microsoft.com/office/drawing/2014/main" xmlns="" id="{5EBEEC90-B83C-4DEE-937E-C7EC1D025508}"/>
+                <a16:creationId xmlns="" xmlns:a16="http://schemas.microsoft.com/office/drawing/2014/main" id="{5EBEEC90-B83C-4DEE-937E-C7EC1D025508}"/>
               </a:ext>
             </a:extLst>
           </p:cNvPr>
@@ -704,7 +704,7 @@
           <p:cNvPr id="2" name="Titolo verticale 1">
             <a:extLst>
               <a:ext uri="{FF2B5EF4-FFF2-40B4-BE49-F238E27FC236}">
-                <a16:creationId xmlns:a16="http://schemas.microsoft.com/office/drawing/2014/main" xmlns="" id="{30E33601-4D9B-4E96-B3C3-AB65F0C81F37}"/>
+                <a16:creationId xmlns="" xmlns:a16="http://schemas.microsoft.com/office/drawing/2014/main" id="{30E33601-4D9B-4E96-B3C3-AB65F0C81F37}"/>
               </a:ext>
             </a:extLst>
           </p:cNvPr>
@@ -737,7 +737,7 @@
           <p:cNvPr id="3" name="Segnaposto testo verticale 2">
             <a:extLst>
               <a:ext uri="{FF2B5EF4-FFF2-40B4-BE49-F238E27FC236}">
-                <a16:creationId xmlns:a16="http://schemas.microsoft.com/office/drawing/2014/main" xmlns="" id="{FEDAA464-5CD2-4C93-83F5-E13251F55648}"/>
+                <a16:creationId xmlns="" xmlns:a16="http://schemas.microsoft.com/office/drawing/2014/main" id="{FEDAA464-5CD2-4C93-83F5-E13251F55648}"/>
               </a:ext>
             </a:extLst>
           </p:cNvPr>
@@ -799,7 +799,7 @@
           <p:cNvPr id="4" name="Segnaposto data 3">
             <a:extLst>
               <a:ext uri="{FF2B5EF4-FFF2-40B4-BE49-F238E27FC236}">
-                <a16:creationId xmlns:a16="http://schemas.microsoft.com/office/drawing/2014/main" xmlns="" id="{F61719B4-CD99-4540-BEA4-8B7884B7C59C}"/>
+                <a16:creationId xmlns="" xmlns:a16="http://schemas.microsoft.com/office/drawing/2014/main" id="{F61719B4-CD99-4540-BEA4-8B7884B7C59C}"/>
               </a:ext>
             </a:extLst>
           </p:cNvPr>
@@ -828,7 +828,7 @@
           <p:cNvPr id="5" name="Segnaposto piè di pagina 4">
             <a:extLst>
               <a:ext uri="{FF2B5EF4-FFF2-40B4-BE49-F238E27FC236}">
-                <a16:creationId xmlns:a16="http://schemas.microsoft.com/office/drawing/2014/main" xmlns="" id="{30F0B4A5-E6FA-4C78-86A7-F528FA130059}"/>
+                <a16:creationId xmlns="" xmlns:a16="http://schemas.microsoft.com/office/drawing/2014/main" id="{30F0B4A5-E6FA-4C78-86A7-F528FA130059}"/>
               </a:ext>
             </a:extLst>
           </p:cNvPr>
@@ -853,7 +853,7 @@
           <p:cNvPr id="6" name="Segnaposto numero diapositiva 5">
             <a:extLst>
               <a:ext uri="{FF2B5EF4-FFF2-40B4-BE49-F238E27FC236}">
-                <a16:creationId xmlns:a16="http://schemas.microsoft.com/office/drawing/2014/main" xmlns="" id="{442BF533-5946-4F10-92FC-3CD5053CF4D8}"/>
+                <a16:creationId xmlns="" xmlns:a16="http://schemas.microsoft.com/office/drawing/2014/main" id="{442BF533-5946-4F10-92FC-3CD5053CF4D8}"/>
               </a:ext>
             </a:extLst>
           </p:cNvPr>
@@ -912,7 +912,7 @@
           <p:cNvPr id="2" name="Titolo 1">
             <a:extLst>
               <a:ext uri="{FF2B5EF4-FFF2-40B4-BE49-F238E27FC236}">
-                <a16:creationId xmlns:a16="http://schemas.microsoft.com/office/drawing/2014/main" xmlns="" id="{8D324EC4-C5F5-4344-815B-63064E440846}"/>
+                <a16:creationId xmlns="" xmlns:a16="http://schemas.microsoft.com/office/drawing/2014/main" id="{8D324EC4-C5F5-4344-815B-63064E440846}"/>
               </a:ext>
             </a:extLst>
           </p:cNvPr>
@@ -940,7 +940,7 @@
           <p:cNvPr id="3" name="Segnaposto contenuto 2">
             <a:extLst>
               <a:ext uri="{FF2B5EF4-FFF2-40B4-BE49-F238E27FC236}">
-                <a16:creationId xmlns:a16="http://schemas.microsoft.com/office/drawing/2014/main" xmlns="" id="{55775342-FE66-4A01-9E0A-B6DFF50813CF}"/>
+                <a16:creationId xmlns="" xmlns:a16="http://schemas.microsoft.com/office/drawing/2014/main" id="{55775342-FE66-4A01-9E0A-B6DFF50813CF}"/>
               </a:ext>
             </a:extLst>
           </p:cNvPr>
@@ -997,7 +997,7 @@
           <p:cNvPr id="4" name="Segnaposto data 3">
             <a:extLst>
               <a:ext uri="{FF2B5EF4-FFF2-40B4-BE49-F238E27FC236}">
-                <a16:creationId xmlns:a16="http://schemas.microsoft.com/office/drawing/2014/main" xmlns="" id="{397A9FE5-70AC-44CE-914B-A1E1953D424A}"/>
+                <a16:creationId xmlns="" xmlns:a16="http://schemas.microsoft.com/office/drawing/2014/main" id="{397A9FE5-70AC-44CE-914B-A1E1953D424A}"/>
               </a:ext>
             </a:extLst>
           </p:cNvPr>
@@ -1026,7 +1026,7 @@
           <p:cNvPr id="5" name="Segnaposto piè di pagina 4">
             <a:extLst>
               <a:ext uri="{FF2B5EF4-FFF2-40B4-BE49-F238E27FC236}">
-                <a16:creationId xmlns:a16="http://schemas.microsoft.com/office/drawing/2014/main" xmlns="" id="{955E82A6-47E5-4A43-8C14-EB032BC59D50}"/>
+                <a16:creationId xmlns="" xmlns:a16="http://schemas.microsoft.com/office/drawing/2014/main" id="{955E82A6-47E5-4A43-8C14-EB032BC59D50}"/>
               </a:ext>
             </a:extLst>
           </p:cNvPr>
@@ -1051,7 +1051,7 @@
           <p:cNvPr id="6" name="Segnaposto numero diapositiva 5">
             <a:extLst>
               <a:ext uri="{FF2B5EF4-FFF2-40B4-BE49-F238E27FC236}">
-                <a16:creationId xmlns:a16="http://schemas.microsoft.com/office/drawing/2014/main" xmlns="" id="{58E8D349-F894-470A-B25E-2196ABC42040}"/>
+                <a16:creationId xmlns="" xmlns:a16="http://schemas.microsoft.com/office/drawing/2014/main" id="{58E8D349-F894-470A-B25E-2196ABC42040}"/>
               </a:ext>
             </a:extLst>
           </p:cNvPr>
@@ -1110,7 +1110,7 @@
           <p:cNvPr id="2" name="Titolo 1">
             <a:extLst>
               <a:ext uri="{FF2B5EF4-FFF2-40B4-BE49-F238E27FC236}">
-                <a16:creationId xmlns:a16="http://schemas.microsoft.com/office/drawing/2014/main" xmlns="" id="{FF8A343A-BEE9-48C2-8F08-6D02BD514F3F}"/>
+                <a16:creationId xmlns="" xmlns:a16="http://schemas.microsoft.com/office/drawing/2014/main" id="{FF8A343A-BEE9-48C2-8F08-6D02BD514F3F}"/>
               </a:ext>
             </a:extLst>
           </p:cNvPr>
@@ -1147,7 +1147,7 @@
           <p:cNvPr id="3" name="Segnaposto testo 2">
             <a:extLst>
               <a:ext uri="{FF2B5EF4-FFF2-40B4-BE49-F238E27FC236}">
-                <a16:creationId xmlns:a16="http://schemas.microsoft.com/office/drawing/2014/main" xmlns="" id="{0909A412-AD76-4989-B06E-E33E0F00580E}"/>
+                <a16:creationId xmlns="" xmlns:a16="http://schemas.microsoft.com/office/drawing/2014/main" id="{0909A412-AD76-4989-B06E-E33E0F00580E}"/>
               </a:ext>
             </a:extLst>
           </p:cNvPr>
@@ -1272,7 +1272,7 @@
           <p:cNvPr id="4" name="Segnaposto data 3">
             <a:extLst>
               <a:ext uri="{FF2B5EF4-FFF2-40B4-BE49-F238E27FC236}">
-                <a16:creationId xmlns:a16="http://schemas.microsoft.com/office/drawing/2014/main" xmlns="" id="{16318882-43E1-4C25-B100-9FE081333575}"/>
+                <a16:creationId xmlns="" xmlns:a16="http://schemas.microsoft.com/office/drawing/2014/main" id="{16318882-43E1-4C25-B100-9FE081333575}"/>
               </a:ext>
             </a:extLst>
           </p:cNvPr>
@@ -1301,7 +1301,7 @@
           <p:cNvPr id="5" name="Segnaposto piè di pagina 4">
             <a:extLst>
               <a:ext uri="{FF2B5EF4-FFF2-40B4-BE49-F238E27FC236}">
-                <a16:creationId xmlns:a16="http://schemas.microsoft.com/office/drawing/2014/main" xmlns="" id="{C6C78431-C23D-4359-9F41-506C478EC2A0}"/>
+                <a16:creationId xmlns="" xmlns:a16="http://schemas.microsoft.com/office/drawing/2014/main" id="{C6C78431-C23D-4359-9F41-506C478EC2A0}"/>
               </a:ext>
             </a:extLst>
           </p:cNvPr>
@@ -1326,7 +1326,7 @@
           <p:cNvPr id="6" name="Segnaposto numero diapositiva 5">
             <a:extLst>
               <a:ext uri="{FF2B5EF4-FFF2-40B4-BE49-F238E27FC236}">
-                <a16:creationId xmlns:a16="http://schemas.microsoft.com/office/drawing/2014/main" xmlns="" id="{DCF015C2-4C12-42A4-9944-4B1FE7A7FFB1}"/>
+                <a16:creationId xmlns="" xmlns:a16="http://schemas.microsoft.com/office/drawing/2014/main" id="{DCF015C2-4C12-42A4-9944-4B1FE7A7FFB1}"/>
               </a:ext>
             </a:extLst>
           </p:cNvPr>
@@ -1385,7 +1385,7 @@
           <p:cNvPr id="2" name="Titolo 1">
             <a:extLst>
               <a:ext uri="{FF2B5EF4-FFF2-40B4-BE49-F238E27FC236}">
-                <a16:creationId xmlns:a16="http://schemas.microsoft.com/office/drawing/2014/main" xmlns="" id="{7650FD1C-41AC-4FD0-8AF4-B2BFB5ECBDC7}"/>
+                <a16:creationId xmlns="" xmlns:a16="http://schemas.microsoft.com/office/drawing/2014/main" id="{7650FD1C-41AC-4FD0-8AF4-B2BFB5ECBDC7}"/>
               </a:ext>
             </a:extLst>
           </p:cNvPr>
@@ -1413,7 +1413,7 @@
           <p:cNvPr id="3" name="Segnaposto contenuto 2">
             <a:extLst>
               <a:ext uri="{FF2B5EF4-FFF2-40B4-BE49-F238E27FC236}">
-                <a16:creationId xmlns:a16="http://schemas.microsoft.com/office/drawing/2014/main" xmlns="" id="{DD16E77D-6E44-4E42-B7EA-AA87E0A9DBF9}"/>
+                <a16:creationId xmlns="" xmlns:a16="http://schemas.microsoft.com/office/drawing/2014/main" id="{DD16E77D-6E44-4E42-B7EA-AA87E0A9DBF9}"/>
               </a:ext>
             </a:extLst>
           </p:cNvPr>
@@ -1475,7 +1475,7 @@
           <p:cNvPr id="4" name="Segnaposto contenuto 3">
             <a:extLst>
               <a:ext uri="{FF2B5EF4-FFF2-40B4-BE49-F238E27FC236}">
-                <a16:creationId xmlns:a16="http://schemas.microsoft.com/office/drawing/2014/main" xmlns="" id="{844F8AF1-BDF4-4BB6-AA12-D9E74887B7AA}"/>
+                <a16:creationId xmlns="" xmlns:a16="http://schemas.microsoft.com/office/drawing/2014/main" id="{844F8AF1-BDF4-4BB6-AA12-D9E74887B7AA}"/>
               </a:ext>
             </a:extLst>
           </p:cNvPr>
@@ -1537,7 +1537,7 @@
           <p:cNvPr id="5" name="Segnaposto data 4">
             <a:extLst>
               <a:ext uri="{FF2B5EF4-FFF2-40B4-BE49-F238E27FC236}">
-                <a16:creationId xmlns:a16="http://schemas.microsoft.com/office/drawing/2014/main" xmlns="" id="{64E49264-4D9E-4F69-ADBE-5FCE7E088F87}"/>
+                <a16:creationId xmlns="" xmlns:a16="http://schemas.microsoft.com/office/drawing/2014/main" id="{64E49264-4D9E-4F69-ADBE-5FCE7E088F87}"/>
               </a:ext>
             </a:extLst>
           </p:cNvPr>
@@ -1566,7 +1566,7 @@
           <p:cNvPr id="6" name="Segnaposto piè di pagina 5">
             <a:extLst>
               <a:ext uri="{FF2B5EF4-FFF2-40B4-BE49-F238E27FC236}">
-                <a16:creationId xmlns:a16="http://schemas.microsoft.com/office/drawing/2014/main" xmlns="" id="{6BD94B07-3F97-448F-A14A-F799F51B318D}"/>
+                <a16:creationId xmlns="" xmlns:a16="http://schemas.microsoft.com/office/drawing/2014/main" id="{6BD94B07-3F97-448F-A14A-F799F51B318D}"/>
               </a:ext>
             </a:extLst>
           </p:cNvPr>
@@ -1591,7 +1591,7 @@
           <p:cNvPr id="7" name="Segnaposto numero diapositiva 6">
             <a:extLst>
               <a:ext uri="{FF2B5EF4-FFF2-40B4-BE49-F238E27FC236}">
-                <a16:creationId xmlns:a16="http://schemas.microsoft.com/office/drawing/2014/main" xmlns="" id="{B0CD1917-F8A2-456F-82E6-C095438948B0}"/>
+                <a16:creationId xmlns="" xmlns:a16="http://schemas.microsoft.com/office/drawing/2014/main" id="{B0CD1917-F8A2-456F-82E6-C095438948B0}"/>
               </a:ext>
             </a:extLst>
           </p:cNvPr>
@@ -1650,7 +1650,7 @@
           <p:cNvPr id="2" name="Titolo 1">
             <a:extLst>
               <a:ext uri="{FF2B5EF4-FFF2-40B4-BE49-F238E27FC236}">
-                <a16:creationId xmlns:a16="http://schemas.microsoft.com/office/drawing/2014/main" xmlns="" id="{B58BF815-104D-4049-9B9F-5BEFA614935C}"/>
+                <a16:creationId xmlns="" xmlns:a16="http://schemas.microsoft.com/office/drawing/2014/main" id="{B58BF815-104D-4049-9B9F-5BEFA614935C}"/>
               </a:ext>
             </a:extLst>
           </p:cNvPr>
@@ -1683,7 +1683,7 @@
           <p:cNvPr id="3" name="Segnaposto testo 2">
             <a:extLst>
               <a:ext uri="{FF2B5EF4-FFF2-40B4-BE49-F238E27FC236}">
-                <a16:creationId xmlns:a16="http://schemas.microsoft.com/office/drawing/2014/main" xmlns="" id="{CAE85FF7-9C0E-4DB9-A6AB-9133F631A4B3}"/>
+                <a16:creationId xmlns="" xmlns:a16="http://schemas.microsoft.com/office/drawing/2014/main" id="{CAE85FF7-9C0E-4DB9-A6AB-9133F631A4B3}"/>
               </a:ext>
             </a:extLst>
           </p:cNvPr>
@@ -1754,7 +1754,7 @@
           <p:cNvPr id="4" name="Segnaposto contenuto 3">
             <a:extLst>
               <a:ext uri="{FF2B5EF4-FFF2-40B4-BE49-F238E27FC236}">
-                <a16:creationId xmlns:a16="http://schemas.microsoft.com/office/drawing/2014/main" xmlns="" id="{31A1FF07-A483-4CBC-B502-D2040A241C59}"/>
+                <a16:creationId xmlns="" xmlns:a16="http://schemas.microsoft.com/office/drawing/2014/main" id="{31A1FF07-A483-4CBC-B502-D2040A241C59}"/>
               </a:ext>
             </a:extLst>
           </p:cNvPr>
@@ -1816,7 +1816,7 @@
           <p:cNvPr id="5" name="Segnaposto testo 4">
             <a:extLst>
               <a:ext uri="{FF2B5EF4-FFF2-40B4-BE49-F238E27FC236}">
-                <a16:creationId xmlns:a16="http://schemas.microsoft.com/office/drawing/2014/main" xmlns="" id="{30D9E67F-0023-4AD8-8149-34BD4C055D4E}"/>
+                <a16:creationId xmlns="" xmlns:a16="http://schemas.microsoft.com/office/drawing/2014/main" id="{30D9E67F-0023-4AD8-8149-34BD4C055D4E}"/>
               </a:ext>
             </a:extLst>
           </p:cNvPr>
@@ -1887,7 +1887,7 @@
           <p:cNvPr id="6" name="Segnaposto contenuto 5">
             <a:extLst>
               <a:ext uri="{FF2B5EF4-FFF2-40B4-BE49-F238E27FC236}">
-                <a16:creationId xmlns:a16="http://schemas.microsoft.com/office/drawing/2014/main" xmlns="" id="{23831668-98C0-4979-87D7-959474A9085E}"/>
+                <a16:creationId xmlns="" xmlns:a16="http://schemas.microsoft.com/office/drawing/2014/main" id="{23831668-98C0-4979-87D7-959474A9085E}"/>
               </a:ext>
             </a:extLst>
           </p:cNvPr>
@@ -1949,7 +1949,7 @@
           <p:cNvPr id="7" name="Segnaposto data 6">
             <a:extLst>
               <a:ext uri="{FF2B5EF4-FFF2-40B4-BE49-F238E27FC236}">
-                <a16:creationId xmlns:a16="http://schemas.microsoft.com/office/drawing/2014/main" xmlns="" id="{91B922F5-7D11-4052-AF29-AA3B75B06734}"/>
+                <a16:creationId xmlns="" xmlns:a16="http://schemas.microsoft.com/office/drawing/2014/main" id="{91B922F5-7D11-4052-AF29-AA3B75B06734}"/>
               </a:ext>
             </a:extLst>
           </p:cNvPr>
@@ -1978,7 +1978,7 @@
           <p:cNvPr id="8" name="Segnaposto piè di pagina 7">
             <a:extLst>
               <a:ext uri="{FF2B5EF4-FFF2-40B4-BE49-F238E27FC236}">
-                <a16:creationId xmlns:a16="http://schemas.microsoft.com/office/drawing/2014/main" xmlns="" id="{6EA02A2F-7388-4F42-A4C6-2A7660ED38E4}"/>
+                <a16:creationId xmlns="" xmlns:a16="http://schemas.microsoft.com/office/drawing/2014/main" id="{6EA02A2F-7388-4F42-A4C6-2A7660ED38E4}"/>
               </a:ext>
             </a:extLst>
           </p:cNvPr>
@@ -2003,7 +2003,7 @@
           <p:cNvPr id="9" name="Segnaposto numero diapositiva 8">
             <a:extLst>
               <a:ext uri="{FF2B5EF4-FFF2-40B4-BE49-F238E27FC236}">
-                <a16:creationId xmlns:a16="http://schemas.microsoft.com/office/drawing/2014/main" xmlns="" id="{CB48DB9B-4650-4AD2-89EF-29E9A37B5E48}"/>
+                <a16:creationId xmlns="" xmlns:a16="http://schemas.microsoft.com/office/drawing/2014/main" id="{CB48DB9B-4650-4AD2-89EF-29E9A37B5E48}"/>
               </a:ext>
             </a:extLst>
           </p:cNvPr>
@@ -2062,7 +2062,7 @@
           <p:cNvPr id="2" name="Titolo 1">
             <a:extLst>
               <a:ext uri="{FF2B5EF4-FFF2-40B4-BE49-F238E27FC236}">
-                <a16:creationId xmlns:a16="http://schemas.microsoft.com/office/drawing/2014/main" xmlns="" id="{7FEFC453-E380-4034-875E-863F49914714}"/>
+                <a16:creationId xmlns="" xmlns:a16="http://schemas.microsoft.com/office/drawing/2014/main" id="{7FEFC453-E380-4034-875E-863F49914714}"/>
               </a:ext>
             </a:extLst>
           </p:cNvPr>
@@ -2090,7 +2090,7 @@
           <p:cNvPr id="3" name="Segnaposto data 2">
             <a:extLst>
               <a:ext uri="{FF2B5EF4-FFF2-40B4-BE49-F238E27FC236}">
-                <a16:creationId xmlns:a16="http://schemas.microsoft.com/office/drawing/2014/main" xmlns="" id="{5BC16F08-373A-43EF-8FBC-2D846E43D6B9}"/>
+                <a16:creationId xmlns="" xmlns:a16="http://schemas.microsoft.com/office/drawing/2014/main" id="{5BC16F08-373A-43EF-8FBC-2D846E43D6B9}"/>
               </a:ext>
             </a:extLst>
           </p:cNvPr>
@@ -2119,7 +2119,7 @@
           <p:cNvPr id="4" name="Segnaposto piè di pagina 3">
             <a:extLst>
               <a:ext uri="{FF2B5EF4-FFF2-40B4-BE49-F238E27FC236}">
-                <a16:creationId xmlns:a16="http://schemas.microsoft.com/office/drawing/2014/main" xmlns="" id="{2A78CDAE-3535-434E-BF92-560FEDD6C387}"/>
+                <a16:creationId xmlns="" xmlns:a16="http://schemas.microsoft.com/office/drawing/2014/main" id="{2A78CDAE-3535-434E-BF92-560FEDD6C387}"/>
               </a:ext>
             </a:extLst>
           </p:cNvPr>
@@ -2144,7 +2144,7 @@
           <p:cNvPr id="5" name="Segnaposto numero diapositiva 4">
             <a:extLst>
               <a:ext uri="{FF2B5EF4-FFF2-40B4-BE49-F238E27FC236}">
-                <a16:creationId xmlns:a16="http://schemas.microsoft.com/office/drawing/2014/main" xmlns="" id="{FAD2588D-B079-4FE5-B454-629CF3E310A3}"/>
+                <a16:creationId xmlns="" xmlns:a16="http://schemas.microsoft.com/office/drawing/2014/main" id="{FAD2588D-B079-4FE5-B454-629CF3E310A3}"/>
               </a:ext>
             </a:extLst>
           </p:cNvPr>
@@ -2203,7 +2203,7 @@
           <p:cNvPr id="2" name="Segnaposto data 1">
             <a:extLst>
               <a:ext uri="{FF2B5EF4-FFF2-40B4-BE49-F238E27FC236}">
-                <a16:creationId xmlns:a16="http://schemas.microsoft.com/office/drawing/2014/main" xmlns="" id="{D9E26DD7-8914-4A23-85B9-0C03B3ACA40C}"/>
+                <a16:creationId xmlns="" xmlns:a16="http://schemas.microsoft.com/office/drawing/2014/main" id="{D9E26DD7-8914-4A23-85B9-0C03B3ACA40C}"/>
               </a:ext>
             </a:extLst>
           </p:cNvPr>
@@ -2232,7 +2232,7 @@
           <p:cNvPr id="3" name="Segnaposto piè di pagina 2">
             <a:extLst>
               <a:ext uri="{FF2B5EF4-FFF2-40B4-BE49-F238E27FC236}">
-                <a16:creationId xmlns:a16="http://schemas.microsoft.com/office/drawing/2014/main" xmlns="" id="{992E87C0-E01E-4B5D-B829-69CEB0DB0D77}"/>
+                <a16:creationId xmlns="" xmlns:a16="http://schemas.microsoft.com/office/drawing/2014/main" id="{992E87C0-E01E-4B5D-B829-69CEB0DB0D77}"/>
               </a:ext>
             </a:extLst>
           </p:cNvPr>
@@ -2257,7 +2257,7 @@
           <p:cNvPr id="4" name="Segnaposto numero diapositiva 3">
             <a:extLst>
               <a:ext uri="{FF2B5EF4-FFF2-40B4-BE49-F238E27FC236}">
-                <a16:creationId xmlns:a16="http://schemas.microsoft.com/office/drawing/2014/main" xmlns="" id="{F7867DD9-A762-457F-A406-B864D98AA788}"/>
+                <a16:creationId xmlns="" xmlns:a16="http://schemas.microsoft.com/office/drawing/2014/main" id="{F7867DD9-A762-457F-A406-B864D98AA788}"/>
               </a:ext>
             </a:extLst>
           </p:cNvPr>
@@ -2316,7 +2316,7 @@
           <p:cNvPr id="2" name="Titolo 1">
             <a:extLst>
               <a:ext uri="{FF2B5EF4-FFF2-40B4-BE49-F238E27FC236}">
-                <a16:creationId xmlns:a16="http://schemas.microsoft.com/office/drawing/2014/main" xmlns="" id="{76124E57-2EC1-4A69-8B20-E15B6D22940F}"/>
+                <a16:creationId xmlns="" xmlns:a16="http://schemas.microsoft.com/office/drawing/2014/main" id="{76124E57-2EC1-4A69-8B20-E15B6D22940F}"/>
               </a:ext>
             </a:extLst>
           </p:cNvPr>
@@ -2353,7 +2353,7 @@
           <p:cNvPr id="3" name="Segnaposto contenuto 2">
             <a:extLst>
               <a:ext uri="{FF2B5EF4-FFF2-40B4-BE49-F238E27FC236}">
-                <a16:creationId xmlns:a16="http://schemas.microsoft.com/office/drawing/2014/main" xmlns="" id="{734D8066-1E08-4CE8-983F-9BBA87274CC7}"/>
+                <a16:creationId xmlns="" xmlns:a16="http://schemas.microsoft.com/office/drawing/2014/main" id="{734D8066-1E08-4CE8-983F-9BBA87274CC7}"/>
               </a:ext>
             </a:extLst>
           </p:cNvPr>
@@ -2443,7 +2443,7 @@
           <p:cNvPr id="4" name="Segnaposto testo 3">
             <a:extLst>
               <a:ext uri="{FF2B5EF4-FFF2-40B4-BE49-F238E27FC236}">
-                <a16:creationId xmlns:a16="http://schemas.microsoft.com/office/drawing/2014/main" xmlns="" id="{F3FA6396-D906-40C8-AE24-510E2F78C7FE}"/>
+                <a16:creationId xmlns="" xmlns:a16="http://schemas.microsoft.com/office/drawing/2014/main" id="{F3FA6396-D906-40C8-AE24-510E2F78C7FE}"/>
               </a:ext>
             </a:extLst>
           </p:cNvPr>
@@ -2514,7 +2514,7 @@
           <p:cNvPr id="5" name="Segnaposto data 4">
             <a:extLst>
               <a:ext uri="{FF2B5EF4-FFF2-40B4-BE49-F238E27FC236}">
-                <a16:creationId xmlns:a16="http://schemas.microsoft.com/office/drawing/2014/main" xmlns="" id="{BAA5942A-3BCE-4482-8A5C-CD97772E8976}"/>
+                <a16:creationId xmlns="" xmlns:a16="http://schemas.microsoft.com/office/drawing/2014/main" id="{BAA5942A-3BCE-4482-8A5C-CD97772E8976}"/>
               </a:ext>
             </a:extLst>
           </p:cNvPr>
@@ -2543,7 +2543,7 @@
           <p:cNvPr id="6" name="Segnaposto piè di pagina 5">
             <a:extLst>
               <a:ext uri="{FF2B5EF4-FFF2-40B4-BE49-F238E27FC236}">
-                <a16:creationId xmlns:a16="http://schemas.microsoft.com/office/drawing/2014/main" xmlns="" id="{99420126-9AFA-4777-BFF5-366C09F8B32E}"/>
+                <a16:creationId xmlns="" xmlns:a16="http://schemas.microsoft.com/office/drawing/2014/main" id="{99420126-9AFA-4777-BFF5-366C09F8B32E}"/>
               </a:ext>
             </a:extLst>
           </p:cNvPr>
@@ -2568,7 +2568,7 @@
           <p:cNvPr id="7" name="Segnaposto numero diapositiva 6">
             <a:extLst>
               <a:ext uri="{FF2B5EF4-FFF2-40B4-BE49-F238E27FC236}">
-                <a16:creationId xmlns:a16="http://schemas.microsoft.com/office/drawing/2014/main" xmlns="" id="{87996299-B8B2-4606-A686-94BC7B31D834}"/>
+                <a16:creationId xmlns="" xmlns:a16="http://schemas.microsoft.com/office/drawing/2014/main" id="{87996299-B8B2-4606-A686-94BC7B31D834}"/>
               </a:ext>
             </a:extLst>
           </p:cNvPr>
@@ -2627,7 +2627,7 @@
           <p:cNvPr id="2" name="Titolo 1">
             <a:extLst>
               <a:ext uri="{FF2B5EF4-FFF2-40B4-BE49-F238E27FC236}">
-                <a16:creationId xmlns:a16="http://schemas.microsoft.com/office/drawing/2014/main" xmlns="" id="{B966293D-979C-4064-9F2B-6124C51E68FE}"/>
+                <a16:creationId xmlns="" xmlns:a16="http://schemas.microsoft.com/office/drawing/2014/main" id="{B966293D-979C-4064-9F2B-6124C51E68FE}"/>
               </a:ext>
             </a:extLst>
           </p:cNvPr>
@@ -2664,7 +2664,7 @@
           <p:cNvPr id="3" name="Segnaposto immagine 2">
             <a:extLst>
               <a:ext uri="{FF2B5EF4-FFF2-40B4-BE49-F238E27FC236}">
-                <a16:creationId xmlns:a16="http://schemas.microsoft.com/office/drawing/2014/main" xmlns="" id="{6A8C2EA0-142A-454E-BAAB-7C4485D60299}"/>
+                <a16:creationId xmlns="" xmlns:a16="http://schemas.microsoft.com/office/drawing/2014/main" id="{6A8C2EA0-142A-454E-BAAB-7C4485D60299}"/>
               </a:ext>
             </a:extLst>
           </p:cNvPr>
@@ -2731,7 +2731,7 @@
           <p:cNvPr id="4" name="Segnaposto testo 3">
             <a:extLst>
               <a:ext uri="{FF2B5EF4-FFF2-40B4-BE49-F238E27FC236}">
-                <a16:creationId xmlns:a16="http://schemas.microsoft.com/office/drawing/2014/main" xmlns="" id="{41AB84A7-19D9-44FE-8513-77CAF35AA7C2}"/>
+                <a16:creationId xmlns="" xmlns:a16="http://schemas.microsoft.com/office/drawing/2014/main" id="{41AB84A7-19D9-44FE-8513-77CAF35AA7C2}"/>
               </a:ext>
             </a:extLst>
           </p:cNvPr>
@@ -2802,7 +2802,7 @@
           <p:cNvPr id="5" name="Segnaposto data 4">
             <a:extLst>
               <a:ext uri="{FF2B5EF4-FFF2-40B4-BE49-F238E27FC236}">
-                <a16:creationId xmlns:a16="http://schemas.microsoft.com/office/drawing/2014/main" xmlns="" id="{8BE837FD-91EA-47CC-A6A0-F23A450D108C}"/>
+                <a16:creationId xmlns="" xmlns:a16="http://schemas.microsoft.com/office/drawing/2014/main" id="{8BE837FD-91EA-47CC-A6A0-F23A450D108C}"/>
               </a:ext>
             </a:extLst>
           </p:cNvPr>
@@ -2831,7 +2831,7 @@
           <p:cNvPr id="6" name="Segnaposto piè di pagina 5">
             <a:extLst>
               <a:ext uri="{FF2B5EF4-FFF2-40B4-BE49-F238E27FC236}">
-                <a16:creationId xmlns:a16="http://schemas.microsoft.com/office/drawing/2014/main" xmlns="" id="{81B3C88D-C08B-4A45-BF0D-04C3264EB32A}"/>
+                <a16:creationId xmlns="" xmlns:a16="http://schemas.microsoft.com/office/drawing/2014/main" id="{81B3C88D-C08B-4A45-BF0D-04C3264EB32A}"/>
               </a:ext>
             </a:extLst>
           </p:cNvPr>
@@ -2856,7 +2856,7 @@
           <p:cNvPr id="7" name="Segnaposto numero diapositiva 6">
             <a:extLst>
               <a:ext uri="{FF2B5EF4-FFF2-40B4-BE49-F238E27FC236}">
-                <a16:creationId xmlns:a16="http://schemas.microsoft.com/office/drawing/2014/main" xmlns="" id="{C35DA505-C2B5-4A20-A0ED-32D6B7B4CE44}"/>
+                <a16:creationId xmlns="" xmlns:a16="http://schemas.microsoft.com/office/drawing/2014/main" id="{C35DA505-C2B5-4A20-A0ED-32D6B7B4CE44}"/>
               </a:ext>
             </a:extLst>
           </p:cNvPr>
@@ -2920,7 +2920,7 @@
           <p:cNvPr id="2" name="Segnaposto titolo 1">
             <a:extLst>
               <a:ext uri="{FF2B5EF4-FFF2-40B4-BE49-F238E27FC236}">
-                <a16:creationId xmlns:a16="http://schemas.microsoft.com/office/drawing/2014/main" xmlns="" id="{4B1D921F-2C48-4285-A8BD-792591D929C6}"/>
+                <a16:creationId xmlns="" xmlns:a16="http://schemas.microsoft.com/office/drawing/2014/main" id="{4B1D921F-2C48-4285-A8BD-792591D929C6}"/>
               </a:ext>
             </a:extLst>
           </p:cNvPr>
@@ -2958,7 +2958,7 @@
           <p:cNvPr id="3" name="Segnaposto testo 2">
             <a:extLst>
               <a:ext uri="{FF2B5EF4-FFF2-40B4-BE49-F238E27FC236}">
-                <a16:creationId xmlns:a16="http://schemas.microsoft.com/office/drawing/2014/main" xmlns="" id="{518CFD04-AD80-4442-9D20-77C3C390CCFF}"/>
+                <a16:creationId xmlns="" xmlns:a16="http://schemas.microsoft.com/office/drawing/2014/main" id="{518CFD04-AD80-4442-9D20-77C3C390CCFF}"/>
               </a:ext>
             </a:extLst>
           </p:cNvPr>
@@ -3025,7 +3025,7 @@
           <p:cNvPr id="4" name="Segnaposto data 3">
             <a:extLst>
               <a:ext uri="{FF2B5EF4-FFF2-40B4-BE49-F238E27FC236}">
-                <a16:creationId xmlns:a16="http://schemas.microsoft.com/office/drawing/2014/main" xmlns="" id="{2D1ACE57-994B-471D-A0C5-61CE109C7E59}"/>
+                <a16:creationId xmlns="" xmlns:a16="http://schemas.microsoft.com/office/drawing/2014/main" id="{2D1ACE57-994B-471D-A0C5-61CE109C7E59}"/>
               </a:ext>
             </a:extLst>
           </p:cNvPr>
@@ -3072,7 +3072,7 @@
           <p:cNvPr id="5" name="Segnaposto piè di pagina 4">
             <a:extLst>
               <a:ext uri="{FF2B5EF4-FFF2-40B4-BE49-F238E27FC236}">
-                <a16:creationId xmlns:a16="http://schemas.microsoft.com/office/drawing/2014/main" xmlns="" id="{311C4A1E-1E5A-4141-9735-E37F71E2C7B0}"/>
+                <a16:creationId xmlns="" xmlns:a16="http://schemas.microsoft.com/office/drawing/2014/main" id="{311C4A1E-1E5A-4141-9735-E37F71E2C7B0}"/>
               </a:ext>
             </a:extLst>
           </p:cNvPr>
@@ -3115,7 +3115,7 @@
           <p:cNvPr id="6" name="Segnaposto numero diapositiva 5">
             <a:extLst>
               <a:ext uri="{FF2B5EF4-FFF2-40B4-BE49-F238E27FC236}">
-                <a16:creationId xmlns:a16="http://schemas.microsoft.com/office/drawing/2014/main" xmlns="" id="{5C64D511-420E-43E5-BCD4-81BC958B8929}"/>
+                <a16:creationId xmlns="" xmlns:a16="http://schemas.microsoft.com/office/drawing/2014/main" id="{5C64D511-420E-43E5-BCD4-81BC958B8929}"/>
               </a:ext>
             </a:extLst>
           </p:cNvPr>
@@ -3491,10 +3491,10 @@
           <p:cNvPr id="8" name="Rectangle 7">
             <a:extLst>
               <a:ext uri="{FF2B5EF4-FFF2-40B4-BE49-F238E27FC236}">
-                <a16:creationId xmlns:a16="http://schemas.microsoft.com/office/drawing/2014/main" xmlns="" id="{23962611-DFD5-4092-AAFD-559E3DFCE2C9}"/>
+                <a16:creationId xmlns="" xmlns:a16="http://schemas.microsoft.com/office/drawing/2014/main" id="{23962611-DFD5-4092-AAFD-559E3DFCE2C9}"/>
               </a:ext>
               <a:ext uri="{C183D7F6-B498-43B3-948B-1728B52AA6E4}">
-                <adec:decorative xmlns:adec="http://schemas.microsoft.com/office/drawing/2017/decorative" xmlns="" val="1"/>
+                <adec:decorative xmlns="" xmlns:adec="http://schemas.microsoft.com/office/drawing/2017/decorative" val="1"/>
               </a:ext>
             </a:extLst>
           </p:cNvPr>
@@ -3504,7 +3504,7 @@
           <p:nvPr>
             <p:extLst>
               <p:ext uri="{386F3935-93C4-4BCD-93E2-E3B085C9AB24}">
-                <p16:designElem xmlns:p16="http://schemas.microsoft.com/office/powerpoint/2015/main" xmlns="" val="1"/>
+                <p16:designElem xmlns="" xmlns:p16="http://schemas.microsoft.com/office/powerpoint/2015/main" val="1"/>
               </p:ext>
             </p:extLst>
           </p:nvPr>
@@ -3576,10 +3576,10 @@
           <p:cNvPr id="10" name="Picture 9">
             <a:extLst>
               <a:ext uri="{FF2B5EF4-FFF2-40B4-BE49-F238E27FC236}">
-                <a16:creationId xmlns:a16="http://schemas.microsoft.com/office/drawing/2014/main" xmlns="" id="{2270F1FA-0425-408F-9861-80BF5AFB276D}"/>
+                <a16:creationId xmlns="" xmlns:a16="http://schemas.microsoft.com/office/drawing/2014/main" id="{2270F1FA-0425-408F-9861-80BF5AFB276D}"/>
               </a:ext>
               <a:ext uri="{C183D7F6-B498-43B3-948B-1728B52AA6E4}">
-                <adec:decorative xmlns:adec="http://schemas.microsoft.com/office/drawing/2017/decorative" xmlns="" val="1"/>
+                <adec:decorative xmlns="" xmlns:adec="http://schemas.microsoft.com/office/drawing/2017/decorative" val="1"/>
               </a:ext>
             </a:extLst>
           </p:cNvPr>
@@ -3589,7 +3589,7 @@
           <p:nvPr>
             <p:extLst>
               <p:ext uri="{386F3935-93C4-4BCD-93E2-E3B085C9AB24}">
-                <p16:designElem xmlns:p16="http://schemas.microsoft.com/office/powerpoint/2015/main" xmlns="" val="1"/>
+                <p16:designElem xmlns="" xmlns:p16="http://schemas.microsoft.com/office/powerpoint/2015/main" val="1"/>
               </p:ext>
             </p:extLst>
           </p:nvPr>
@@ -3621,7 +3621,7 @@
           <p:cNvPr id="2" name="Titolo 1">
             <a:extLst>
               <a:ext uri="{FF2B5EF4-FFF2-40B4-BE49-F238E27FC236}">
-                <a16:creationId xmlns:a16="http://schemas.microsoft.com/office/drawing/2014/main" xmlns="" id="{DCBAC149-DB9F-4874-BC24-7F077AA4B78D}"/>
+                <a16:creationId xmlns="" xmlns:a16="http://schemas.microsoft.com/office/drawing/2014/main" id="{DCBAC149-DB9F-4874-BC24-7F077AA4B78D}"/>
               </a:ext>
             </a:extLst>
           </p:cNvPr>
@@ -3665,7 +3665,7 @@
           <p:cNvPr id="3" name="Sottotitolo 2">
             <a:extLst>
               <a:ext uri="{FF2B5EF4-FFF2-40B4-BE49-F238E27FC236}">
-                <a16:creationId xmlns:a16="http://schemas.microsoft.com/office/drawing/2014/main" xmlns="" id="{B9F686C4-B595-4CDD-8233-91A53C48A369}"/>
+                <a16:creationId xmlns="" xmlns:a16="http://schemas.microsoft.com/office/drawing/2014/main" id="{B9F686C4-B595-4CDD-8233-91A53C48A369}"/>
               </a:ext>
             </a:extLst>
           </p:cNvPr>
@@ -3734,7 +3734,7 @@
           <p:cNvPr id="2" name="Titolo 1">
             <a:extLst>
               <a:ext uri="{FF2B5EF4-FFF2-40B4-BE49-F238E27FC236}">
-                <a16:creationId xmlns:a16="http://schemas.microsoft.com/office/drawing/2014/main" xmlns="" id="{B7EC37DD-9E0C-4C6E-A811-00302AD6EACB}"/>
+                <a16:creationId xmlns="" xmlns:a16="http://schemas.microsoft.com/office/drawing/2014/main" id="{B7EC37DD-9E0C-4C6E-A811-00302AD6EACB}"/>
               </a:ext>
             </a:extLst>
           </p:cNvPr>
@@ -3767,7 +3767,7 @@
           <p:cNvPr id="4" name="Tabella 4">
             <a:extLst>
               <a:ext uri="{FF2B5EF4-FFF2-40B4-BE49-F238E27FC236}">
-                <a16:creationId xmlns:a16="http://schemas.microsoft.com/office/drawing/2014/main" xmlns="" id="{043F75E0-1B48-4C2E-8ADF-C8441714A81A}"/>
+                <a16:creationId xmlns="" xmlns:a16="http://schemas.microsoft.com/office/drawing/2014/main" id="{043F75E0-1B48-4C2E-8ADF-C8441714A81A}"/>
               </a:ext>
             </a:extLst>
           </p:cNvPr>
@@ -3797,14 +3797,14 @@
                 <a:gridCol w="2483498">
                   <a:extLst>
                     <a:ext uri="{9D8B030D-6E8A-4147-A177-3AD203B41FA5}">
-                      <a16:colId xmlns:a16="http://schemas.microsoft.com/office/drawing/2014/main" xmlns="" val="414173828"/>
+                      <a16:colId xmlns="" xmlns:a16="http://schemas.microsoft.com/office/drawing/2014/main" val="414173828"/>
                     </a:ext>
                   </a:extLst>
                 </a:gridCol>
                 <a:gridCol w="8032102">
                   <a:extLst>
                     <a:ext uri="{9D8B030D-6E8A-4147-A177-3AD203B41FA5}">
-                      <a16:colId xmlns:a16="http://schemas.microsoft.com/office/drawing/2014/main" xmlns="" val="418542194"/>
+                      <a16:colId xmlns="" xmlns:a16="http://schemas.microsoft.com/office/drawing/2014/main" val="418542194"/>
                     </a:ext>
                   </a:extLst>
                 </a:gridCol>
@@ -3839,7 +3839,7 @@
                 </a:tc>
                 <a:extLst>
                   <a:ext uri="{0D108BD9-81ED-4DB2-BD59-A6C34878D82A}">
-                    <a16:rowId xmlns:a16="http://schemas.microsoft.com/office/drawing/2014/main" xmlns="" val="246340804"/>
+                    <a16:rowId xmlns="" xmlns:a16="http://schemas.microsoft.com/office/drawing/2014/main" val="246340804"/>
                   </a:ext>
                 </a:extLst>
               </a:tr>
@@ -3873,7 +3873,7 @@
                 </a:tc>
                 <a:extLst>
                   <a:ext uri="{0D108BD9-81ED-4DB2-BD59-A6C34878D82A}">
-                    <a16:rowId xmlns:a16="http://schemas.microsoft.com/office/drawing/2014/main" xmlns="" val="2368987764"/>
+                    <a16:rowId xmlns="" xmlns:a16="http://schemas.microsoft.com/office/drawing/2014/main" val="2368987764"/>
                   </a:ext>
                 </a:extLst>
               </a:tr>
@@ -3907,7 +3907,7 @@
                 </a:tc>
                 <a:extLst>
                   <a:ext uri="{0D108BD9-81ED-4DB2-BD59-A6C34878D82A}">
-                    <a16:rowId xmlns:a16="http://schemas.microsoft.com/office/drawing/2014/main" xmlns="" val="301388857"/>
+                    <a16:rowId xmlns="" xmlns:a16="http://schemas.microsoft.com/office/drawing/2014/main" val="301388857"/>
                   </a:ext>
                 </a:extLst>
               </a:tr>
@@ -3945,7 +3945,7 @@
                 </a:tc>
                 <a:extLst>
                   <a:ext uri="{0D108BD9-81ED-4DB2-BD59-A6C34878D82A}">
-                    <a16:rowId xmlns:a16="http://schemas.microsoft.com/office/drawing/2014/main" xmlns="" val="2333084500"/>
+                    <a16:rowId xmlns="" xmlns:a16="http://schemas.microsoft.com/office/drawing/2014/main" val="2333084500"/>
                   </a:ext>
                 </a:extLst>
               </a:tr>
@@ -3979,7 +3979,7 @@
                 </a:tc>
                 <a:extLst>
                   <a:ext uri="{0D108BD9-81ED-4DB2-BD59-A6C34878D82A}">
-                    <a16:rowId xmlns:a16="http://schemas.microsoft.com/office/drawing/2014/main" xmlns="" val="2773735045"/>
+                    <a16:rowId xmlns="" xmlns:a16="http://schemas.microsoft.com/office/drawing/2014/main" val="2773735045"/>
                   </a:ext>
                 </a:extLst>
               </a:tr>
@@ -4017,7 +4017,7 @@
                 </a:tc>
                 <a:extLst>
                   <a:ext uri="{0D108BD9-81ED-4DB2-BD59-A6C34878D82A}">
-                    <a16:rowId xmlns:a16="http://schemas.microsoft.com/office/drawing/2014/main" xmlns="" val="3315426333"/>
+                    <a16:rowId xmlns="" xmlns:a16="http://schemas.microsoft.com/office/drawing/2014/main" val="3315426333"/>
                   </a:ext>
                 </a:extLst>
               </a:tr>
@@ -4051,7 +4051,7 @@
                 </a:tc>
                 <a:extLst>
                   <a:ext uri="{0D108BD9-81ED-4DB2-BD59-A6C34878D82A}">
-                    <a16:rowId xmlns:a16="http://schemas.microsoft.com/office/drawing/2014/main" xmlns="" val="833276135"/>
+                    <a16:rowId xmlns="" xmlns:a16="http://schemas.microsoft.com/office/drawing/2014/main" val="833276135"/>
                   </a:ext>
                 </a:extLst>
               </a:tr>
@@ -4085,7 +4085,7 @@
                 </a:tc>
                 <a:extLst>
                   <a:ext uri="{0D108BD9-81ED-4DB2-BD59-A6C34878D82A}">
-                    <a16:rowId xmlns:a16="http://schemas.microsoft.com/office/drawing/2014/main" xmlns="" val="1615278520"/>
+                    <a16:rowId xmlns="" xmlns:a16="http://schemas.microsoft.com/office/drawing/2014/main" val="1615278520"/>
                   </a:ext>
                 </a:extLst>
               </a:tr>
@@ -4098,7 +4098,7 @@
           <p:cNvPr id="7" name="Elemento grafico 6" descr="Informazioni">
             <a:extLst>
               <a:ext uri="{FF2B5EF4-FFF2-40B4-BE49-F238E27FC236}">
-                <a16:creationId xmlns:a16="http://schemas.microsoft.com/office/drawing/2014/main" xmlns="" id="{53D936C3-6DDC-4194-987E-7AE9EFD9723F}"/>
+                <a16:creationId xmlns="" xmlns:a16="http://schemas.microsoft.com/office/drawing/2014/main" id="{53D936C3-6DDC-4194-987E-7AE9EFD9723F}"/>
               </a:ext>
             </a:extLst>
           </p:cNvPr>
@@ -4114,7 +4114,7 @@
                 <a14:useLocalDpi xmlns:a14="http://schemas.microsoft.com/office/drawing/2010/main" val="0"/>
               </a:ext>
               <a:ext uri="{96DAC541-7B7A-43D3-8B79-37D633B846F1}">
-                <asvg:svgBlip xmlns:asvg="http://schemas.microsoft.com/office/drawing/2016/SVG/main" xmlns="" r:embed="rId3"/>
+                <asvg:svgBlip xmlns="" xmlns:asvg="http://schemas.microsoft.com/office/drawing/2016/SVG/main" r:embed="rId3"/>
               </a:ext>
             </a:extLst>
           </a:blip>
@@ -4167,7 +4167,7 @@
           <p:cNvPr id="2" name="Titolo 1">
             <a:extLst>
               <a:ext uri="{FF2B5EF4-FFF2-40B4-BE49-F238E27FC236}">
-                <a16:creationId xmlns:a16="http://schemas.microsoft.com/office/drawing/2014/main" xmlns="" id="{FF61BD71-50E0-44C1-A558-965A7ABC70AD}"/>
+                <a16:creationId xmlns="" xmlns:a16="http://schemas.microsoft.com/office/drawing/2014/main" id="{FF61BD71-50E0-44C1-A558-965A7ABC70AD}"/>
               </a:ext>
             </a:extLst>
           </p:cNvPr>
@@ -4195,7 +4195,7 @@
           <p:cNvPr id="4" name="Tabella 4">
             <a:extLst>
               <a:ext uri="{FF2B5EF4-FFF2-40B4-BE49-F238E27FC236}">
-                <a16:creationId xmlns:a16="http://schemas.microsoft.com/office/drawing/2014/main" xmlns="" id="{0BC89AA1-366F-4BE5-824E-0153DB6DF5C3}"/>
+                <a16:creationId xmlns="" xmlns:a16="http://schemas.microsoft.com/office/drawing/2014/main" id="{0BC89AA1-366F-4BE5-824E-0153DB6DF5C3}"/>
               </a:ext>
             </a:extLst>
           </p:cNvPr>
@@ -4225,14 +4225,14 @@
                 <a:gridCol w="2866053">
                   <a:extLst>
                     <a:ext uri="{9D8B030D-6E8A-4147-A177-3AD203B41FA5}">
-                      <a16:colId xmlns:a16="http://schemas.microsoft.com/office/drawing/2014/main" xmlns="" val="3900888184"/>
+                      <a16:colId xmlns="" xmlns:a16="http://schemas.microsoft.com/office/drawing/2014/main" val="3900888184"/>
                     </a:ext>
                   </a:extLst>
                 </a:gridCol>
                 <a:gridCol w="7649547">
                   <a:extLst>
                     <a:ext uri="{9D8B030D-6E8A-4147-A177-3AD203B41FA5}">
-                      <a16:colId xmlns:a16="http://schemas.microsoft.com/office/drawing/2014/main" xmlns="" val="2392364571"/>
+                      <a16:colId xmlns="" xmlns:a16="http://schemas.microsoft.com/office/drawing/2014/main" val="2392364571"/>
                     </a:ext>
                   </a:extLst>
                 </a:gridCol>
@@ -4271,7 +4271,7 @@
                 </a:tc>
                 <a:extLst>
                   <a:ext uri="{0D108BD9-81ED-4DB2-BD59-A6C34878D82A}">
-                    <a16:rowId xmlns:a16="http://schemas.microsoft.com/office/drawing/2014/main" xmlns="" val="2750207453"/>
+                    <a16:rowId xmlns="" xmlns:a16="http://schemas.microsoft.com/office/drawing/2014/main" val="2750207453"/>
                   </a:ext>
                 </a:extLst>
               </a:tr>
@@ -4309,7 +4309,7 @@
                 </a:tc>
                 <a:extLst>
                   <a:ext uri="{0D108BD9-81ED-4DB2-BD59-A6C34878D82A}">
-                    <a16:rowId xmlns:a16="http://schemas.microsoft.com/office/drawing/2014/main" xmlns="" val="43365482"/>
+                    <a16:rowId xmlns="" xmlns:a16="http://schemas.microsoft.com/office/drawing/2014/main" val="43365482"/>
                   </a:ext>
                 </a:extLst>
               </a:tr>
@@ -4339,7 +4339,7 @@
                 </a:tc>
                 <a:extLst>
                   <a:ext uri="{0D108BD9-81ED-4DB2-BD59-A6C34878D82A}">
-                    <a16:rowId xmlns:a16="http://schemas.microsoft.com/office/drawing/2014/main" xmlns="" val="1813106428"/>
+                    <a16:rowId xmlns="" xmlns:a16="http://schemas.microsoft.com/office/drawing/2014/main" val="1813106428"/>
                   </a:ext>
                 </a:extLst>
               </a:tr>
@@ -4373,7 +4373,7 @@
                 </a:tc>
                 <a:extLst>
                   <a:ext uri="{0D108BD9-81ED-4DB2-BD59-A6C34878D82A}">
-                    <a16:rowId xmlns:a16="http://schemas.microsoft.com/office/drawing/2014/main" xmlns="" val="4265491522"/>
+                    <a16:rowId xmlns="" xmlns:a16="http://schemas.microsoft.com/office/drawing/2014/main" val="4265491522"/>
                   </a:ext>
                 </a:extLst>
               </a:tr>
@@ -4407,7 +4407,7 @@
                 </a:tc>
                 <a:extLst>
                   <a:ext uri="{0D108BD9-81ED-4DB2-BD59-A6C34878D82A}">
-                    <a16:rowId xmlns:a16="http://schemas.microsoft.com/office/drawing/2014/main" xmlns="" val="1759204447"/>
+                    <a16:rowId xmlns="" xmlns:a16="http://schemas.microsoft.com/office/drawing/2014/main" val="1759204447"/>
                   </a:ext>
                 </a:extLst>
               </a:tr>
@@ -4453,7 +4453,7 @@
                 </a:tc>
                 <a:extLst>
                   <a:ext uri="{0D108BD9-81ED-4DB2-BD59-A6C34878D82A}">
-                    <a16:rowId xmlns:a16="http://schemas.microsoft.com/office/drawing/2014/main" xmlns="" val="4176074482"/>
+                    <a16:rowId xmlns="" xmlns:a16="http://schemas.microsoft.com/office/drawing/2014/main" val="4176074482"/>
                   </a:ext>
                 </a:extLst>
               </a:tr>
@@ -4487,7 +4487,7 @@
                 </a:tc>
                 <a:extLst>
                   <a:ext uri="{0D108BD9-81ED-4DB2-BD59-A6C34878D82A}">
-                    <a16:rowId xmlns:a16="http://schemas.microsoft.com/office/drawing/2014/main" xmlns="" val="2176725863"/>
+                    <a16:rowId xmlns="" xmlns:a16="http://schemas.microsoft.com/office/drawing/2014/main" val="2176725863"/>
                   </a:ext>
                 </a:extLst>
               </a:tr>
@@ -4500,7 +4500,7 @@
           <p:cNvPr id="7" name="Elemento grafico 6" descr="Alta tensione">
             <a:extLst>
               <a:ext uri="{FF2B5EF4-FFF2-40B4-BE49-F238E27FC236}">
-                <a16:creationId xmlns:a16="http://schemas.microsoft.com/office/drawing/2014/main" xmlns="" id="{4BC6B4F9-BBF9-493A-8CEC-E6BC93390131}"/>
+                <a16:creationId xmlns="" xmlns:a16="http://schemas.microsoft.com/office/drawing/2014/main" id="{4BC6B4F9-BBF9-493A-8CEC-E6BC93390131}"/>
               </a:ext>
             </a:extLst>
           </p:cNvPr>
@@ -4516,7 +4516,7 @@
                 <a14:useLocalDpi xmlns:a14="http://schemas.microsoft.com/office/drawing/2010/main" val="0"/>
               </a:ext>
               <a:ext uri="{96DAC541-7B7A-43D3-8B79-37D633B846F1}">
-                <asvg:svgBlip xmlns:asvg="http://schemas.microsoft.com/office/drawing/2016/SVG/main" xmlns="" r:embed="rId3"/>
+                <asvg:svgBlip xmlns="" xmlns:asvg="http://schemas.microsoft.com/office/drawing/2016/SVG/main" r:embed="rId3"/>
               </a:ext>
             </a:extLst>
           </a:blip>
@@ -4569,7 +4569,7 @@
           <p:cNvPr id="2" name="Titolo 1">
             <a:extLst>
               <a:ext uri="{FF2B5EF4-FFF2-40B4-BE49-F238E27FC236}">
-                <a16:creationId xmlns:a16="http://schemas.microsoft.com/office/drawing/2014/main" xmlns="" id="{A8B055A1-B3E5-4E97-BAF3-4C33FEAE38D5}"/>
+                <a16:creationId xmlns="" xmlns:a16="http://schemas.microsoft.com/office/drawing/2014/main" id="{A8B055A1-B3E5-4E97-BAF3-4C33FEAE38D5}"/>
               </a:ext>
             </a:extLst>
           </p:cNvPr>
@@ -4603,7 +4603,7 @@
           <p:cNvPr id="4" name="Tabella 4">
             <a:extLst>
               <a:ext uri="{FF2B5EF4-FFF2-40B4-BE49-F238E27FC236}">
-                <a16:creationId xmlns:a16="http://schemas.microsoft.com/office/drawing/2014/main" xmlns="" id="{67C1CEAA-13A3-482D-AA09-BF3FC903FFE5}"/>
+                <a16:creationId xmlns="" xmlns:a16="http://schemas.microsoft.com/office/drawing/2014/main" id="{67C1CEAA-13A3-482D-AA09-BF3FC903FFE5}"/>
               </a:ext>
             </a:extLst>
           </p:cNvPr>
@@ -4614,7 +4614,7 @@
             <p:ph idx="1"/>
             <p:extLst>
               <p:ext uri="{D42A27DB-BD31-4B8C-83A1-F6EECF244321}">
-                <p14:modId xmlns:p14="http://schemas.microsoft.com/office/powerpoint/2010/main" val="1310163403"/>
+                <p14:modId xmlns:p14="http://schemas.microsoft.com/office/powerpoint/2010/main" val="3495671062"/>
               </p:ext>
             </p:extLst>
           </p:nvPr>
@@ -4633,14 +4633,14 @@
                 <a:gridCol w="2688771">
                   <a:extLst>
                     <a:ext uri="{9D8B030D-6E8A-4147-A177-3AD203B41FA5}">
-                      <a16:colId xmlns:a16="http://schemas.microsoft.com/office/drawing/2014/main" xmlns="" val="634955233"/>
+                      <a16:colId xmlns="" xmlns:a16="http://schemas.microsoft.com/office/drawing/2014/main" val="634955233"/>
                     </a:ext>
                   </a:extLst>
                 </a:gridCol>
                 <a:gridCol w="7826829">
                   <a:extLst>
                     <a:ext uri="{9D8B030D-6E8A-4147-A177-3AD203B41FA5}">
-                      <a16:colId xmlns:a16="http://schemas.microsoft.com/office/drawing/2014/main" xmlns="" val="1784330953"/>
+                      <a16:colId xmlns="" xmlns:a16="http://schemas.microsoft.com/office/drawing/2014/main" val="1784330953"/>
                     </a:ext>
                   </a:extLst>
                 </a:gridCol>
@@ -4684,12 +4684,25 @@
                       </a:pPr>
                       <a:r>
                         <a:rPr lang="it-IT" baseline="0" dirty="0" smtClean="0"/>
-                        <a:t>Il sistema aggiornerà le news </a:t>
+                        <a:t>Il sistema </a:t>
                       </a:r>
                       <a:r>
                         <a:rPr lang="it-IT" baseline="0" dirty="0" smtClean="0"/>
-                        <a:t>attuali</a:t>
-                      </a:r>
+                        <a:t>reperisce le </a:t>
+                      </a:r>
+                      <a:r>
+                        <a:rPr lang="it-IT" baseline="0" dirty="0" smtClean="0"/>
+                        <a:t>news </a:t>
+                      </a:r>
+                      <a:r>
+                        <a:rPr lang="it-IT" baseline="0" dirty="0" smtClean="0"/>
+                        <a:t>da </a:t>
+                      </a:r>
+                      <a:r>
+                        <a:rPr lang="it-IT" baseline="0" smtClean="0"/>
+                        <a:t>InfoBlu</a:t>
+                      </a:r>
+                      <a:endParaRPr lang="it-IT" baseline="0" dirty="0" smtClean="0"/>
                     </a:p>
                     <a:p>
                       <a:pPr marL="342900" indent="-342900">
@@ -4698,11 +4711,7 @@
                       </a:pPr>
                       <a:r>
                         <a:rPr lang="it-IT" baseline="0" dirty="0" smtClean="0"/>
-                        <a:t>L’applicazione mostrerà le anteprime delle news nella </a:t>
-                      </a:r>
-                      <a:r>
-                        <a:rPr lang="it-IT" baseline="0" dirty="0" smtClean="0"/>
-                        <a:t>home dell’</a:t>
+                        <a:t>L’applicazione mostrerà le anteprime delle news nella home dell’</a:t>
                       </a:r>
                       <a:r>
                         <a:rPr lang="it-IT" baseline="0" dirty="0" err="1" smtClean="0"/>
@@ -4718,7 +4727,7 @@
                 </a:tc>
                 <a:extLst>
                   <a:ext uri="{0D108BD9-81ED-4DB2-BD59-A6C34878D82A}">
-                    <a16:rowId xmlns:a16="http://schemas.microsoft.com/office/drawing/2014/main" xmlns="" val="400559187"/>
+                    <a16:rowId xmlns="" xmlns:a16="http://schemas.microsoft.com/office/drawing/2014/main" val="400559187"/>
                   </a:ext>
                 </a:extLst>
               </a:tr>
@@ -4789,7 +4798,7 @@
                 </a:tc>
                 <a:extLst>
                   <a:ext uri="{0D108BD9-81ED-4DB2-BD59-A6C34878D82A}">
-                    <a16:rowId xmlns:a16="http://schemas.microsoft.com/office/drawing/2014/main" xmlns="" val="286916072"/>
+                    <a16:rowId xmlns="" xmlns:a16="http://schemas.microsoft.com/office/drawing/2014/main" val="286916072"/>
                   </a:ext>
                 </a:extLst>
               </a:tr>
@@ -4823,7 +4832,7 @@
                 </a:tc>
                 <a:extLst>
                   <a:ext uri="{0D108BD9-81ED-4DB2-BD59-A6C34878D82A}">
-                    <a16:rowId xmlns:a16="http://schemas.microsoft.com/office/drawing/2014/main" xmlns="" val="1276537878"/>
+                    <a16:rowId xmlns="" xmlns:a16="http://schemas.microsoft.com/office/drawing/2014/main" val="1276537878"/>
                   </a:ext>
                 </a:extLst>
               </a:tr>
@@ -4836,7 +4845,7 @@
           <p:cNvPr id="8" name="Elemento grafico 7" descr="Flusso di lavoro">
             <a:extLst>
               <a:ext uri="{FF2B5EF4-FFF2-40B4-BE49-F238E27FC236}">
-                <a16:creationId xmlns:a16="http://schemas.microsoft.com/office/drawing/2014/main" xmlns="" id="{A495AF70-8473-45AA-80C8-B98D01FB12D2}"/>
+                <a16:creationId xmlns="" xmlns:a16="http://schemas.microsoft.com/office/drawing/2014/main" id="{A495AF70-8473-45AA-80C8-B98D01FB12D2}"/>
               </a:ext>
             </a:extLst>
           </p:cNvPr>
@@ -4852,7 +4861,7 @@
                 <a14:useLocalDpi xmlns:a14="http://schemas.microsoft.com/office/drawing/2010/main" val="0"/>
               </a:ext>
               <a:ext uri="{96DAC541-7B7A-43D3-8B79-37D633B846F1}">
-                <asvg:svgBlip xmlns:asvg="http://schemas.microsoft.com/office/drawing/2016/SVG/main" xmlns="" r:embed="rId3"/>
+                <asvg:svgBlip xmlns="" xmlns:asvg="http://schemas.microsoft.com/office/drawing/2016/SVG/main" r:embed="rId3"/>
               </a:ext>
             </a:extLst>
           </a:blip>
@@ -5172,7 +5181,7 @@
   <a:extraClrSchemeLst/>
   <a:extLst>
     <a:ext uri="{05A4C25C-085E-4340-85A3-A5531E510DB2}">
-      <thm15:themeFamily xmlns:thm15="http://schemas.microsoft.com/office/thememl/2012/main" xmlns="" name="Office Theme" id="{62F939B6-93AF-4DB8-9C6B-D6C7DFDC589F}" vid="{4A3C46E8-61CC-4603-A589-7422A47A8E4A}"/>
+      <thm15:themeFamily xmlns="" xmlns:thm15="http://schemas.microsoft.com/office/thememl/2012/main" name="Office Theme" id="{62F939B6-93AF-4DB8-9C6B-D6C7DFDC589F}" vid="{4A3C46E8-61CC-4603-A589-7422A47A8E4A}"/>
     </a:ext>
   </a:extLst>
 </a:theme>

</xml_diff>